<commit_message>
updating Session 3 notes
</commit_message>
<xml_diff>
--- a/Chanco_STA6206_BDA_2019_Henrion_Session3.pptx
+++ b/Chanco_STA6206_BDA_2019_Henrion_Session3.pptx
@@ -35,6 +35,7 @@
     <p:sldId id="283" r:id="rId29"/>
     <p:sldId id="284" r:id="rId30"/>
     <p:sldId id="285" r:id="rId31"/>
+    <p:sldId id="286" r:id="rId32"/>
   </p:sldIdLst>
   <p:sldSz cx="12192000" cy="6858000"/>
   <p:notesSz cx="6858000" cy="9144000"/>
@@ -6199,61 +6200,6 @@
           <a:chExt cx="0" cy="0"/>
         </a:xfrm>
       </p:grpSpPr>
-      <p:sp>
-        <p:nvSpPr>
-          <p:cNvPr id="2" name="Title 1">
-            <a:extLst>
-              <a:ext uri="{FF2B5EF4-FFF2-40B4-BE49-F238E27FC236}">
-                <a16:creationId xmlns:a16="http://schemas.microsoft.com/office/drawing/2014/main" id="{D6AA89D5-560C-4369-A313-7C24EDF028A0}"/>
-              </a:ext>
-            </a:extLst>
-          </p:cNvPr>
-          <p:cNvSpPr>
-            <a:spLocks noGrp="1"/>
-          </p:cNvSpPr>
-          <p:nvPr>
-            <p:ph type="title"/>
-          </p:nvPr>
-        </p:nvSpPr>
-        <p:spPr/>
-        <p:txBody>
-          <a:bodyPr/>
-          <a:lstStyle/>
-          <a:p>
-            <a:pPr lvl="0" marL="0" indent="0">
-              <a:buNone/>
-            </a:pPr>
-            <a:r>
-              <a:rPr/>
-              <a:t>Bayesian</a:t>
-            </a:r>
-            <a:r>
-              <a:rPr/>
-              <a:t> </a:t>
-            </a:r>
-            <a:r>
-              <a:rPr/>
-              <a:t>estimation:</a:t>
-            </a:r>
-            <a:r>
-              <a:rPr/>
-              <a:t> </a:t>
-            </a:r>
-            <a:r>
-              <a:rPr/>
-              <a:t>Credible</a:t>
-            </a:r>
-            <a:r>
-              <a:rPr/>
-              <a:t> </a:t>
-            </a:r>
-            <a:r>
-              <a:rPr/>
-              <a:t>intervals</a:t>
-            </a:r>
-          </a:p>
-        </p:txBody>
-      </p:sp>
       <mc:AlternateContent xmlns:mc="http://schemas.openxmlformats.org/markup-compatibility/2006">
         <mc:Choice xmlns:a14="http://schemas.microsoft.com/office/drawing/2010/main" Requires="a14">
           <p:sp>
@@ -6297,108 +6243,26 @@
                 <a:pPr lvl="0" marL="0" indent="0">
                   <a:buNone/>
                 </a:pPr>
-                <a:r>
-                  <a:rPr/>
-                  <a:t>It is often desirable to identify regions of the parameter space that have a high probability of containing the parameter. To do this we can construct, after observing some data </a:t>
-                </a:r>
-                <a14:m>
-                  <m:oMath xmlns:m="http://schemas.openxmlformats.org/officeDocument/2006/math">
-                    <m:r>
-                      <m:t>y</m:t>
-                    </m:r>
-                  </m:oMath>
-                </a14:m>
-                <a:r>
-                  <a:rPr/>
-                  <a:t>, an interval (say) </a:t>
-                </a:r>
-                <a14:m>
-                  <m:oMath xmlns:m="http://schemas.openxmlformats.org/officeDocument/2006/math">
-                    <m:r>
-                      <m:t>[</m:t>
-                    </m:r>
-                    <m:r>
-                      <m:t>l</m:t>
-                    </m:r>
-                    <m:r>
-                      <m:t>(</m:t>
-                    </m:r>
-                    <m:r>
-                      <m:t>y</m:t>
-                    </m:r>
-                    <m:r>
-                      <m:t>)</m:t>
-                    </m:r>
-                    <m:r>
-                      <m:t>,</m:t>
-                    </m:r>
-                    <m:r>
-                      <m:t>u</m:t>
-                    </m:r>
-                    <m:r>
-                      <m:t>(</m:t>
-                    </m:r>
-                    <m:r>
-                      <m:t>y</m:t>
-                    </m:r>
-                    <m:r>
-                      <m:t>)</m:t>
-                    </m:r>
-                    <m:r>
-                      <m:t>]</m:t>
-                    </m:r>
-                  </m:oMath>
-                </a14:m>
-                <a:r>
-                  <a:rPr/>
-                  <a:t> such that the probability that </a:t>
-                </a:r>
-                <a14:m>
-                  <m:oMath xmlns:m="http://schemas.openxmlformats.org/officeDocument/2006/math">
-                    <m:r>
-                      <m:t>θ</m:t>
-                    </m:r>
-                    <m:r>
-                      <m:t>∈</m:t>
-                    </m:r>
-                    <m:r>
-                      <m:t>[</m:t>
-                    </m:r>
-                    <m:r>
-                      <m:t>l</m:t>
-                    </m:r>
-                    <m:r>
-                      <m:t>(</m:t>
-                    </m:r>
-                    <m:r>
-                      <m:t>y</m:t>
-                    </m:r>
-                    <m:r>
-                      <m:t>)</m:t>
-                    </m:r>
-                    <m:r>
-                      <m:t>,</m:t>
-                    </m:r>
-                    <m:r>
-                      <m:t>u</m:t>
-                    </m:r>
-                    <m:r>
-                      <m:t>(</m:t>
-                    </m:r>
-                    <m:r>
-                      <m:t>y</m:t>
-                    </m:r>
-                    <m:r>
-                      <m:t>)</m:t>
-                    </m:r>
-                    <m:r>
-                      <m:t>]</m:t>
-                    </m:r>
-                  </m:oMath>
-                </a14:m>
-                <a:r>
-                  <a:rPr/>
-                  <a:t> is high.</a:t>
+                <a14:m>
+                  <m:oMathPara xmlns:m="http://schemas.openxmlformats.org/officeDocument/2006/math">
+                    <m:oMathParaPr>
+                      <m:jc m:val="center"/>
+                    </m:oMathParaPr>
+                    <m:oMath>
+                      <m:r>
+                        <m:t> </m:t>
+                      </m:r>
+                    </m:oMath>
+                  </m:oMathPara>
+                </a14:m>
+              </a:p>
+              <a:p>
+                <a:pPr lvl="0" marL="0" indent="0">
+                  <a:buNone/>
+                </a:pPr>
+                <a:r>
+                  <a:rPr b="1"/>
+                  <a:t>CREDIBLE INTERVALS</a:t>
                 </a:r>
               </a:p>
             </p:txBody>
@@ -6635,84 +6499,6 @@
                 <a:pPr lvl="0" marL="0" indent="0">
                   <a:buNone/>
                 </a:pPr>
-                <a:r>
-                  <a:rPr b="1"/>
-                  <a:t>Bayesian coverage</a:t>
-                </a:r>
-              </a:p>
-              <a:p>
-                <a:pPr lvl="0" marL="0" indent="0">
-                  <a:buNone/>
-                </a:pPr>
-                <a:r>
-                  <a:rPr/>
-                  <a:t>An interval based on observed data </a:t>
-                </a:r>
-                <a14:m>
-                  <m:oMath xmlns:m="http://schemas.openxmlformats.org/officeDocument/2006/math">
-                    <m:r>
-                      <m:t>Y</m:t>
-                    </m:r>
-                    <m:r>
-                      <m:t>=</m:t>
-                    </m:r>
-                    <m:r>
-                      <m:t>y</m:t>
-                    </m:r>
-                  </m:oMath>
-                </a14:m>
-                <a:r>
-                  <a:rPr/>
-                  <a:t> has </a:t>
-                </a:r>
-                <a14:m>
-                  <m:oMath xmlns:m="http://schemas.openxmlformats.org/officeDocument/2006/math">
-                    <m:r>
-                      <m:t>100</m:t>
-                    </m:r>
-                    <m:r>
-                      <m:t>×</m:t>
-                    </m:r>
-                    <m:r>
-                      <m:t>(</m:t>
-                    </m:r>
-                    <m:r>
-                      <m:t>1</m:t>
-                    </m:r>
-                    <m:r>
-                      <m:t>−</m:t>
-                    </m:r>
-                    <m:r>
-                      <m:t>α</m:t>
-                    </m:r>
-                    <m:r>
-                      <m:t>)</m:t>
-                    </m:r>
-                    <m:r>
-                      <m:t>%</m:t>
-                    </m:r>
-                  </m:oMath>
-                </a14:m>
-                <a:r>
-                  <a:rPr/>
-                  <a:t> Bayesian coverage for </a:t>
-                </a:r>
-                <a14:m>
-                  <m:oMath xmlns:m="http://schemas.openxmlformats.org/officeDocument/2006/math">
-                    <m:r>
-                      <m:t>θ</m:t>
-                    </m:r>
-                  </m:oMath>
-                </a14:m>
-                <a:r>
-                  <a:rPr/>
-                  <a:t> if</a:t>
-                </a:r>
-              </a:p>
-              <a:p>
-                <a:pPr lvl="0" marL="0" indent="0">
-                  <a:buNone/>
-                </a:pPr>
                 <a14:m>
                   <m:oMathPara xmlns:m="http://schemas.openxmlformats.org/officeDocument/2006/math">
                     <m:oMathParaPr>
@@ -6720,76 +6506,7 @@
                     </m:oMathParaPr>
                     <m:oMath>
                       <m:r>
-                        <m:t>P</m:t>
-                      </m:r>
-                      <m:r>
-                        <m:t>(</m:t>
-                      </m:r>
-                      <m:r>
-                        <m:t>l</m:t>
-                      </m:r>
-                      <m:r>
-                        <m:t>(</m:t>
-                      </m:r>
-                      <m:r>
-                        <m:t>y</m:t>
-                      </m:r>
-                      <m:r>
-                        <m:t>)</m:t>
-                      </m:r>
-                      <m:r>
-                        <m:t>&lt;</m:t>
-                      </m:r>
-                      <m:r>
-                        <m:t>θ</m:t>
-                      </m:r>
-                      <m:r>
-                        <m:t>&lt;</m:t>
-                      </m:r>
-                      <m:r>
-                        <m:t>u</m:t>
-                      </m:r>
-                      <m:r>
-                        <m:t>(</m:t>
-                      </m:r>
-                      <m:r>
-                        <m:t>y</m:t>
-                      </m:r>
-                      <m:r>
-                        <m:t>)</m:t>
-                      </m:r>
-                      <m:r>
                         <m:t> </m:t>
-                      </m:r>
-                      <m:r>
-                        <m:t>|</m:t>
-                      </m:r>
-                      <m:r>
-                        <m:t> </m:t>
-                      </m:r>
-                      <m:r>
-                        <m:t>Y</m:t>
-                      </m:r>
-                      <m:r>
-                        <m:t>=</m:t>
-                      </m:r>
-                      <m:r>
-                        <m:t>y</m:t>
-                      </m:r>
-                      <m:r>
-                        <m:t>)</m:t>
-                      </m:r>
-                      <m:r>
-                        <m:t>=</m:t>
-                      </m:r>
-                      <m:r>
-                        <m:t>1</m:t>
-                      </m:r>
-                      <m:r>
-                        <m:t>−</m:t>
-                      </m:r>
-                      <m:r>
-                        <m:t>α</m:t>
                       </m:r>
                     </m:oMath>
                   </m:oMathPara>
@@ -6801,18 +6518,106 @@
                 </a:pPr>
                 <a:r>
                   <a:rPr/>
-                  <a:t>Note that here </a:t>
+                  <a:t>It is often desirable to identify regions of the parameter space that have a high probability of containing the parameter. To do this we can construct, after observing some data </a:t>
                 </a:r>
                 <a14:m>
                   <m:oMath xmlns:m="http://schemas.openxmlformats.org/officeDocument/2006/math">
                     <m:r>
+                      <m:t>y</m:t>
+                    </m:r>
+                  </m:oMath>
+                </a14:m>
+                <a:r>
+                  <a:rPr/>
+                  <a:t>, an interval (say) </a:t>
+                </a:r>
+                <a14:m>
+                  <m:oMath xmlns:m="http://schemas.openxmlformats.org/officeDocument/2006/math">
+                    <m:r>
+                      <m:t>[</m:t>
+                    </m:r>
+                    <m:r>
+                      <m:t>l</m:t>
+                    </m:r>
+                    <m:r>
+                      <m:t>(</m:t>
+                    </m:r>
+                    <m:r>
+                      <m:t>y</m:t>
+                    </m:r>
+                    <m:r>
+                      <m:t>)</m:t>
+                    </m:r>
+                    <m:r>
+                      <m:t>,</m:t>
+                    </m:r>
+                    <m:r>
+                      <m:t>u</m:t>
+                    </m:r>
+                    <m:r>
+                      <m:t>(</m:t>
+                    </m:r>
+                    <m:r>
+                      <m:t>y</m:t>
+                    </m:r>
+                    <m:r>
+                      <m:t>)</m:t>
+                    </m:r>
+                    <m:r>
+                      <m:t>]</m:t>
+                    </m:r>
+                  </m:oMath>
+                </a14:m>
+                <a:r>
+                  <a:rPr/>
+                  <a:t> such that the probability that </a:t>
+                </a:r>
+                <a14:m>
+                  <m:oMath xmlns:m="http://schemas.openxmlformats.org/officeDocument/2006/math">
+                    <m:r>
                       <m:t>θ</m:t>
                     </m:r>
+                    <m:r>
+                      <m:t>∈</m:t>
+                    </m:r>
+                    <m:r>
+                      <m:t>[</m:t>
+                    </m:r>
+                    <m:r>
+                      <m:t>l</m:t>
+                    </m:r>
+                    <m:r>
+                      <m:t>(</m:t>
+                    </m:r>
+                    <m:r>
+                      <m:t>y</m:t>
+                    </m:r>
+                    <m:r>
+                      <m:t>)</m:t>
+                    </m:r>
+                    <m:r>
+                      <m:t>,</m:t>
+                    </m:r>
+                    <m:r>
+                      <m:t>u</m:t>
+                    </m:r>
+                    <m:r>
+                      <m:t>(</m:t>
+                    </m:r>
+                    <m:r>
+                      <m:t>y</m:t>
+                    </m:r>
+                    <m:r>
+                      <m:t>)</m:t>
+                    </m:r>
+                    <m:r>
+                      <m:t>]</m:t>
+                    </m:r>
                   </m:oMath>
                 </a14:m>
                 <a:r>
                   <a:rPr/>
-                  <a:t> is random, the interval is fixed.</a:t>
+                  <a:t> is high.</a:t>
                 </a:r>
               </a:p>
             </p:txBody>
@@ -6924,7 +6729,7 @@
                 </a:pPr>
                 <a:r>
                   <a:rPr b="1"/>
-                  <a:t>Frequentist coverage</a:t>
+                  <a:t>Bayesian coverage</a:t>
                 </a:r>
               </a:p>
               <a:p>
@@ -6933,96 +6738,67 @@
                 </a:pPr>
                 <a:r>
                   <a:rPr/>
-                  <a:t>An </a:t>
-                </a:r>
-                <a:r>
-                  <a:rPr i="1"/>
-                  <a:t>random</a:t>
-                </a:r>
-                <a:r>
-                  <a:rPr/>
-                  <a:t> interval </a:t>
+                  <a:t>An interval based on observed data </a:t>
                 </a:r>
                 <a14:m>
                   <m:oMath xmlns:m="http://schemas.openxmlformats.org/officeDocument/2006/math">
                     <m:r>
-                      <m:t>[</m:t>
-                    </m:r>
-                    <m:r>
-                      <m:t>l</m:t>
+                      <m:t>Y</m:t>
+                    </m:r>
+                    <m:r>
+                      <m:t>=</m:t>
+                    </m:r>
+                    <m:r>
+                      <m:t>y</m:t>
+                    </m:r>
+                  </m:oMath>
+                </a14:m>
+                <a:r>
+                  <a:rPr/>
+                  <a:t> has </a:t>
+                </a:r>
+                <a14:m>
+                  <m:oMath xmlns:m="http://schemas.openxmlformats.org/officeDocument/2006/math">
+                    <m:r>
+                      <m:t>100</m:t>
+                    </m:r>
+                    <m:r>
+                      <m:t>×</m:t>
                     </m:r>
                     <m:r>
                       <m:t>(</m:t>
                     </m:r>
                     <m:r>
-                      <m:t>Y</m:t>
+                      <m:t>1</m:t>
+                    </m:r>
+                    <m:r>
+                      <m:t>−</m:t>
+                    </m:r>
+                    <m:r>
+                      <m:t>α</m:t>
                     </m:r>
                     <m:r>
                       <m:t>)</m:t>
                     </m:r>
                     <m:r>
-                      <m:t>,</m:t>
-                    </m:r>
-                    <m:r>
-                      <m:t>u</m:t>
-                    </m:r>
-                    <m:r>
-                      <m:t>(</m:t>
-                    </m:r>
-                    <m:r>
-                      <m:t>Y</m:t>
-                    </m:r>
-                    <m:r>
-                      <m:t>)</m:t>
+                      <m:t>%</m:t>
                     </m:r>
                   </m:oMath>
                 </a14:m>
                 <a:r>
                   <a:rPr/>
-                  <a:t> has </a:t>
+                  <a:t> Bayesian coverage for </a:t>
                 </a:r>
                 <a14:m>
                   <m:oMath xmlns:m="http://schemas.openxmlformats.org/officeDocument/2006/math">
                     <m:r>
-                      <m:t>100</m:t>
-                    </m:r>
-                    <m:r>
-                      <m:t>×</m:t>
-                    </m:r>
-                    <m:r>
-                      <m:t>(</m:t>
-                    </m:r>
-                    <m:r>
-                      <m:t>1</m:t>
-                    </m:r>
-                    <m:r>
-                      <m:t>−</m:t>
-                    </m:r>
-                    <m:r>
-                      <m:t>α</m:t>
-                    </m:r>
-                    <m:r>
-                      <m:t>)</m:t>
-                    </m:r>
-                    <m:r>
-                      <m:t>%</m:t>
+                      <m:t>θ</m:t>
                     </m:r>
                   </m:oMath>
                 </a14:m>
                 <a:r>
                   <a:rPr/>
-                  <a:t> frequentist coverage for </a:t>
-                </a:r>
-                <a14:m>
-                  <m:oMath xmlns:m="http://schemas.openxmlformats.org/officeDocument/2006/math">
-                    <m:r>
-                      <m:t>θ</m:t>
-                    </m:r>
-                  </m:oMath>
-                </a14:m>
-                <a:r>
-                  <a:rPr/>
-                  <a:t> if, before the data are collected,</a:t>
+                  <a:t> if</a:t>
                 </a:r>
               </a:p>
               <a:p>
@@ -7048,40 +6824,49 @@
                         <m:t>(</m:t>
                       </m:r>
                       <m:r>
+                        <m:t>y</m:t>
+                      </m:r>
+                      <m:r>
+                        <m:t>)</m:t>
+                      </m:r>
+                      <m:r>
+                        <m:t>&lt;</m:t>
+                      </m:r>
+                      <m:r>
+                        <m:t>θ</m:t>
+                      </m:r>
+                      <m:r>
+                        <m:t>&lt;</m:t>
+                      </m:r>
+                      <m:r>
+                        <m:t>u</m:t>
+                      </m:r>
+                      <m:r>
+                        <m:t>(</m:t>
+                      </m:r>
+                      <m:r>
+                        <m:t>y</m:t>
+                      </m:r>
+                      <m:r>
+                        <m:t>)</m:t>
+                      </m:r>
+                      <m:r>
+                        <m:t> </m:t>
+                      </m:r>
+                      <m:r>
+                        <m:t>|</m:t>
+                      </m:r>
+                      <m:r>
+                        <m:t> </m:t>
+                      </m:r>
+                      <m:r>
                         <m:t>Y</m:t>
                       </m:r>
                       <m:r>
-                        <m:t>)</m:t>
-                      </m:r>
-                      <m:r>
-                        <m:t>&lt;</m:t>
-                      </m:r>
-                      <m:r>
-                        <m:t>θ</m:t>
-                      </m:r>
-                      <m:r>
-                        <m:t>&lt;</m:t>
-                      </m:r>
-                      <m:r>
-                        <m:t>u</m:t>
-                      </m:r>
-                      <m:r>
-                        <m:t>(</m:t>
-                      </m:r>
-                      <m:r>
-                        <m:t>Y</m:t>
-                      </m:r>
-                      <m:r>
-                        <m:t>)</m:t>
-                      </m:r>
-                      <m:r>
-                        <m:t> </m:t>
-                      </m:r>
-                      <m:r>
-                        <m:t>|</m:t>
-                      </m:r>
-                      <m:r>
-                        <m:t>θ</m:t>
+                        <m:t>=</m:t>
+                      </m:r>
+                      <m:r>
+                        <m:t>y</m:t>
                       </m:r>
                       <m:r>
                         <m:t>)</m:t>
@@ -7119,7 +6904,7 @@
                 </a14:m>
                 <a:r>
                   <a:rPr/>
-                  <a:t> is fixed, the interval is random.</a:t>
+                  <a:t> is random, the interval is fixed.</a:t>
                 </a:r>
               </a:p>
             </p:txBody>
@@ -7229,6 +7014,113 @@
                 <a:pPr lvl="0" marL="0" indent="0">
                   <a:buNone/>
                 </a:pPr>
+                <a:r>
+                  <a:rPr b="1"/>
+                  <a:t>Frequentist coverage</a:t>
+                </a:r>
+              </a:p>
+              <a:p>
+                <a:pPr lvl="0" marL="0" indent="0">
+                  <a:buNone/>
+                </a:pPr>
+                <a:r>
+                  <a:rPr/>
+                  <a:t>An </a:t>
+                </a:r>
+                <a:r>
+                  <a:rPr i="1"/>
+                  <a:t>random</a:t>
+                </a:r>
+                <a:r>
+                  <a:rPr/>
+                  <a:t> interval </a:t>
+                </a:r>
+                <a14:m>
+                  <m:oMath xmlns:m="http://schemas.openxmlformats.org/officeDocument/2006/math">
+                    <m:r>
+                      <m:t>[</m:t>
+                    </m:r>
+                    <m:r>
+                      <m:t>l</m:t>
+                    </m:r>
+                    <m:r>
+                      <m:t>(</m:t>
+                    </m:r>
+                    <m:r>
+                      <m:t>Y</m:t>
+                    </m:r>
+                    <m:r>
+                      <m:t>)</m:t>
+                    </m:r>
+                    <m:r>
+                      <m:t>,</m:t>
+                    </m:r>
+                    <m:r>
+                      <m:t>u</m:t>
+                    </m:r>
+                    <m:r>
+                      <m:t>(</m:t>
+                    </m:r>
+                    <m:r>
+                      <m:t>Y</m:t>
+                    </m:r>
+                    <m:r>
+                      <m:t>)</m:t>
+                    </m:r>
+                  </m:oMath>
+                </a14:m>
+                <a:r>
+                  <a:rPr/>
+                  <a:t> has </a:t>
+                </a:r>
+                <a14:m>
+                  <m:oMath xmlns:m="http://schemas.openxmlformats.org/officeDocument/2006/math">
+                    <m:r>
+                      <m:t>100</m:t>
+                    </m:r>
+                    <m:r>
+                      <m:t>×</m:t>
+                    </m:r>
+                    <m:r>
+                      <m:t>(</m:t>
+                    </m:r>
+                    <m:r>
+                      <m:t>1</m:t>
+                    </m:r>
+                    <m:r>
+                      <m:t>−</m:t>
+                    </m:r>
+                    <m:r>
+                      <m:t>α</m:t>
+                    </m:r>
+                    <m:r>
+                      <m:t>)</m:t>
+                    </m:r>
+                    <m:r>
+                      <m:t>%</m:t>
+                    </m:r>
+                  </m:oMath>
+                </a14:m>
+                <a:r>
+                  <a:rPr/>
+                  <a:t> frequentist coverage for </a:t>
+                </a:r>
+                <a14:m>
+                  <m:oMath xmlns:m="http://schemas.openxmlformats.org/officeDocument/2006/math">
+                    <m:r>
+                      <m:t>θ</m:t>
+                    </m:r>
+                  </m:oMath>
+                </a14:m>
+                <a:r>
+                  <a:rPr/>
+                  <a:t> if, before the data are collected,</a:t>
+                </a:r>
+              </a:p>
+              <a:p>
+                <a:pPr lvl="0" marL="0" indent="0">
+                  <a:buNone/>
+                </a:pPr>
                 <a14:m>
                   <m:oMathPara xmlns:m="http://schemas.openxmlformats.org/officeDocument/2006/math">
                     <m:oMathParaPr>
@@ -7236,7 +7128,67 @@
                     </m:oMathParaPr>
                     <m:oMath>
                       <m:r>
+                        <m:t>P</m:t>
+                      </m:r>
+                      <m:r>
+                        <m:t>(</m:t>
+                      </m:r>
+                      <m:r>
+                        <m:t>l</m:t>
+                      </m:r>
+                      <m:r>
+                        <m:t>(</m:t>
+                      </m:r>
+                      <m:r>
+                        <m:t>Y</m:t>
+                      </m:r>
+                      <m:r>
+                        <m:t>)</m:t>
+                      </m:r>
+                      <m:r>
+                        <m:t>&lt;</m:t>
+                      </m:r>
+                      <m:r>
+                        <m:t>θ</m:t>
+                      </m:r>
+                      <m:r>
+                        <m:t>&lt;</m:t>
+                      </m:r>
+                      <m:r>
+                        <m:t>u</m:t>
+                      </m:r>
+                      <m:r>
+                        <m:t>(</m:t>
+                      </m:r>
+                      <m:r>
+                        <m:t>Y</m:t>
+                      </m:r>
+                      <m:r>
+                        <m:t>)</m:t>
+                      </m:r>
+                      <m:r>
                         <m:t> </m:t>
+                      </m:r>
+                      <m:r>
+                        <m:t>|</m:t>
+                      </m:r>
+                      <m:r>
+                        <m:t>θ</m:t>
+                      </m:r>
+                      <m:r>
+                        <m:t>)</m:t>
+                      </m:r>
+                      <m:r>
+                        <m:t>=</m:t>
+                      </m:r>
+                      <m:r>
+                        <m:t>1</m:t>
+                      </m:r>
+                      <m:r>
+                        <m:t>−</m:t>
+                      </m:r>
+                      <m:r>
+                        <m:t>α</m:t>
                       </m:r>
                     </m:oMath>
                   </m:oMathPara>
@@ -7248,91 +7200,18 @@
                 </a:pPr>
                 <a:r>
                   <a:rPr/>
-                  <a:t>Bayesian intervals are usually called </a:t>
-                </a:r>
-                <a:r>
-                  <a:rPr b="1"/>
-                  <a:t>credible intervals</a:t>
-                </a:r>
-                <a:r>
-                  <a:rPr/>
-                  <a:t> and frequentist intevals are called </a:t>
-                </a:r>
-                <a:r>
-                  <a:rPr b="1"/>
-                  <a:t>confidence intervals</a:t>
-                </a:r>
-                <a:r>
-                  <a:rPr/>
-                  <a:t>.</a:t>
-                </a:r>
-              </a:p>
-              <a:p>
-                <a:pPr lvl="0" marL="0" indent="0">
-                  <a:buNone/>
-                </a:pPr>
-                <a14:m>
-                  <m:oMathPara xmlns:m="http://schemas.openxmlformats.org/officeDocument/2006/math">
-                    <m:oMathParaPr>
-                      <m:jc m:val="center"/>
-                    </m:oMathParaPr>
-                    <m:oMath>
-                      <m:r>
-                        <m:t> </m:t>
-                      </m:r>
-                    </m:oMath>
-                  </m:oMathPara>
-                </a14:m>
-              </a:p>
-              <a:p>
-                <a:pPr lvl="0" marL="0" indent="0">
-                  <a:buNone/>
-                </a:pPr>
-                <a:r>
-                  <a:rPr/>
-                  <a:t>However, </a:t>
-                </a:r>
-                <a:r>
-                  <a:rPr b="1"/>
-                  <a:t>Bayesian confidence interval</a:t>
-                </a:r>
-                <a:r>
-                  <a:rPr/>
-                  <a:t> and </a:t>
-                </a:r>
-                <a:r>
-                  <a:rPr b="1"/>
-                  <a:t>frequentist confidence interval</a:t>
-                </a:r>
-                <a:r>
-                  <a:rPr/>
-                  <a:t> are also in use.</a:t>
-                </a:r>
-              </a:p>
-              <a:p>
-                <a:pPr lvl="0" marL="0" indent="0">
-                  <a:buNone/>
-                </a:pPr>
-                <a14:m>
-                  <m:oMathPara xmlns:m="http://schemas.openxmlformats.org/officeDocument/2006/math">
-                    <m:oMathParaPr>
-                      <m:jc m:val="center"/>
-                    </m:oMathParaPr>
-                    <m:oMath>
-                      <m:r>
-                        <m:t> </m:t>
-                      </m:r>
-                    </m:oMath>
-                  </m:oMathPara>
-                </a14:m>
-              </a:p>
-              <a:p>
-                <a:pPr lvl="0" marL="0" indent="0">
-                  <a:buNone/>
-                </a:pPr>
-                <a:r>
-                  <a:rPr/>
-                  <a:t>Bayesian confidence intervals also have frequentist coverage – see Hoff P. D. (2009), Sections 3.1.2 and 3.4 for a comment on this.</a:t>
+                  <a:t>Note that here </a:t>
+                </a:r>
+                <a14:m>
+                  <m:oMath xmlns:m="http://schemas.openxmlformats.org/officeDocument/2006/math">
+                    <m:r>
+                      <m:t>θ</m:t>
+                    </m:r>
+                  </m:oMath>
+                </a14:m>
+                <a:r>
+                  <a:rPr/>
+                  <a:t> is fixed, the interval is random.</a:t>
                 </a:r>
               </a:p>
             </p:txBody>
@@ -7461,25 +7340,41 @@
                 </a:pPr>
                 <a:r>
                   <a:rPr/>
-                  <a:t>Frequentist confidence intervals are often centered on the point estimate. If not centered on the point estimate, they at the very least contain it and so </a:t>
-                </a:r>
-                <a:r>
-                  <a:rPr i="1"/>
-                  <a:t>anchor</a:t>
-                </a:r>
-                <a:r>
-                  <a:rPr/>
-                  <a:t> the interval.</a:t>
+                  <a:t>Bayesian intervals are usually called </a:t>
+                </a:r>
+                <a:r>
+                  <a:rPr b="1"/>
+                  <a:t>credible intervals</a:t>
+                </a:r>
+                <a:r>
+                  <a:rPr/>
+                  <a:t> and frequentist intevals are called </a:t>
+                </a:r>
+                <a:r>
+                  <a:rPr b="1"/>
+                  <a:t>confidence intervals</a:t>
+                </a:r>
+                <a:r>
+                  <a:rPr/>
+                  <a:t>.</a:t>
                 </a:r>
               </a:p>
               <a:p>
                 <a:pPr lvl="0" marL="0" indent="0">
                   <a:buNone/>
                 </a:pPr>
-                <a:r>
-                  <a:rPr/>
-                  <a:t>In a Bayesian setting this is a bit less straightforward: we could pick any interval along the support to get an interval with the desired coverage.</a:t>
-                </a:r>
+                <a14:m>
+                  <m:oMathPara xmlns:m="http://schemas.openxmlformats.org/officeDocument/2006/math">
+                    <m:oMathParaPr>
+                      <m:jc m:val="center"/>
+                    </m:oMathParaPr>
+                    <m:oMath>
+                      <m:r>
+                        <m:t> </m:t>
+                      </m:r>
+                    </m:oMath>
+                  </m:oMathPara>
+                </a14:m>
               </a:p>
               <a:p>
                 <a:pPr lvl="0" marL="0" indent="0">
@@ -7487,7 +7382,49 @@
                 </a:pPr>
                 <a:r>
                   <a:rPr/>
-                  <a:t>We could simply center the interval on a chosen posterior point estimate such as the posterior mean. There are other ways to construct such intervals though.</a:t>
+                  <a:t>However, </a:t>
+                </a:r>
+                <a:r>
+                  <a:rPr b="1"/>
+                  <a:t>Bayesian confidence interval</a:t>
+                </a:r>
+                <a:r>
+                  <a:rPr/>
+                  <a:t> and </a:t>
+                </a:r>
+                <a:r>
+                  <a:rPr b="1"/>
+                  <a:t>frequentist confidence interval</a:t>
+                </a:r>
+                <a:r>
+                  <a:rPr/>
+                  <a:t> are also in use.</a:t>
+                </a:r>
+              </a:p>
+              <a:p>
+                <a:pPr lvl="0" marL="0" indent="0">
+                  <a:buNone/>
+                </a:pPr>
+                <a14:m>
+                  <m:oMathPara xmlns:m="http://schemas.openxmlformats.org/officeDocument/2006/math">
+                    <m:oMathParaPr>
+                      <m:jc m:val="center"/>
+                    </m:oMathParaPr>
+                    <m:oMath>
+                      <m:r>
+                        <m:t> </m:t>
+                      </m:r>
+                    </m:oMath>
+                  </m:oMathPara>
+                </a14:m>
+              </a:p>
+              <a:p>
+                <a:pPr lvl="0" marL="0" indent="0">
+                  <a:buNone/>
+                </a:pPr>
+                <a:r>
+                  <a:rPr/>
+                  <a:t>Bayesian confidence intervals also have frequentist coverage – see Hoff P. D. (2009), Sections 3.1.2 and 3.4 for a comment on this.</a:t>
                 </a:r>
               </a:p>
             </p:txBody>
@@ -7500,6 +7437,161 @@
 </file>
 
 <file path=ppt/slides/slide24.xml><?xml version="1.0" encoding="utf-8"?>
+<p:sld xmlns:a="http://schemas.openxmlformats.org/drawingml/2006/main" xmlns:r="http://schemas.openxmlformats.org/officeDocument/2006/relationships" xmlns:p="http://schemas.openxmlformats.org/presentationml/2006/main">
+  <p:cSld>
+    <p:spTree>
+      <p:nvGrpSpPr>
+        <p:cNvPr id="1" name=""/>
+        <p:cNvGrpSpPr/>
+        <p:nvPr/>
+      </p:nvGrpSpPr>
+      <p:grpSpPr>
+        <a:xfrm>
+          <a:off x="0" y="0"/>
+          <a:ext cx="0" cy="0"/>
+          <a:chOff x="0" y="0"/>
+          <a:chExt cx="0" cy="0"/>
+        </a:xfrm>
+      </p:grpSpPr>
+      <p:sp>
+        <p:nvSpPr>
+          <p:cNvPr id="2" name="Title 1">
+            <a:extLst>
+              <a:ext uri="{FF2B5EF4-FFF2-40B4-BE49-F238E27FC236}">
+                <a16:creationId xmlns:a16="http://schemas.microsoft.com/office/drawing/2014/main" id="{D6AA89D5-560C-4369-A313-7C24EDF028A0}"/>
+              </a:ext>
+            </a:extLst>
+          </p:cNvPr>
+          <p:cNvSpPr>
+            <a:spLocks noGrp="1"/>
+          </p:cNvSpPr>
+          <p:nvPr>
+            <p:ph type="title"/>
+          </p:nvPr>
+        </p:nvSpPr>
+        <p:spPr/>
+        <p:txBody>
+          <a:bodyPr/>
+          <a:lstStyle/>
+          <a:p>
+            <a:pPr lvl="0" marL="0" indent="0">
+              <a:buNone/>
+            </a:pPr>
+            <a:r>
+              <a:rPr/>
+              <a:t>Bayesian</a:t>
+            </a:r>
+            <a:r>
+              <a:rPr/>
+              <a:t> </a:t>
+            </a:r>
+            <a:r>
+              <a:rPr/>
+              <a:t>estimation:</a:t>
+            </a:r>
+            <a:r>
+              <a:rPr/>
+              <a:t> </a:t>
+            </a:r>
+            <a:r>
+              <a:rPr/>
+              <a:t>Credible</a:t>
+            </a:r>
+            <a:r>
+              <a:rPr/>
+              <a:t> </a:t>
+            </a:r>
+            <a:r>
+              <a:rPr/>
+              <a:t>intervals</a:t>
+            </a:r>
+          </a:p>
+        </p:txBody>
+      </p:sp>
+      <mc:AlternateContent xmlns:mc="http://schemas.openxmlformats.org/markup-compatibility/2006">
+        <mc:Choice xmlns:a14="http://schemas.microsoft.com/office/drawing/2010/main" Requires="a14">
+          <p:sp>
+            <p:nvSpPr>
+              <p:cNvPr id="3" name="Content Placeholder 2">
+                <a:extLst>
+                  <a:ext uri="{FF2B5EF4-FFF2-40B4-BE49-F238E27FC236}">
+                    <a16:creationId xmlns:a16="http://schemas.microsoft.com/office/drawing/2014/main" id="{288BC91F-1C76-43AE-8B2A-956D48B768BE}"/>
+                  </a:ext>
+                </a:extLst>
+              </p:cNvPr>
+              <p:cNvSpPr>
+                <a:spLocks noGrp="1"/>
+              </p:cNvSpPr>
+              <p:nvPr>
+                <p:ph idx="1"/>
+              </p:nvPr>
+            </p:nvSpPr>
+            <p:spPr/>
+            <p:txBody>
+              <a:bodyPr/>
+              <a:lstStyle/>
+              <a:p>
+                <a:pPr lvl="0" marL="0" indent="0">
+                  <a:buNone/>
+                </a:pPr>
+                <a14:m>
+                  <m:oMathPara xmlns:m="http://schemas.openxmlformats.org/officeDocument/2006/math">
+                    <m:oMathParaPr>
+                      <m:jc m:val="center"/>
+                    </m:oMathParaPr>
+                    <m:oMath>
+                      <m:r>
+                        <m:t> </m:t>
+                      </m:r>
+                    </m:oMath>
+                  </m:oMathPara>
+                </a14:m>
+              </a:p>
+              <a:p>
+                <a:pPr lvl="0" marL="0" indent="0">
+                  <a:buNone/>
+                </a:pPr>
+                <a:r>
+                  <a:rPr/>
+                  <a:t>Frequentist confidence intervals are often centered on the point estimate. If not centered on the point estimate, they at the very least contain it and so </a:t>
+                </a:r>
+                <a:r>
+                  <a:rPr i="1"/>
+                  <a:t>anchor</a:t>
+                </a:r>
+                <a:r>
+                  <a:rPr/>
+                  <a:t> the interval.</a:t>
+                </a:r>
+              </a:p>
+              <a:p>
+                <a:pPr lvl="0" marL="0" indent="0">
+                  <a:buNone/>
+                </a:pPr>
+                <a:r>
+                  <a:rPr/>
+                  <a:t>In a Bayesian setting this is a bit less straightforward: we could pick any interval along the support to get an interval with the desired coverage.</a:t>
+                </a:r>
+              </a:p>
+              <a:p>
+                <a:pPr lvl="0" marL="0" indent="0">
+                  <a:buNone/>
+                </a:pPr>
+                <a:r>
+                  <a:rPr/>
+                  <a:t>We could simply center the interval on a chosen posterior point estimate such as the posterior mean. There are other ways to construct such intervals though.</a:t>
+                </a:r>
+              </a:p>
+            </p:txBody>
+          </p:sp>
+        </mc:Choice>
+      </mc:AlternateContent>
+    </p:spTree>
+  </p:cSld>
+</p:sld>
+</file>
+
+<file path=ppt/slides/slide25.xml><?xml version="1.0" encoding="utf-8"?>
 <p:sld xmlns:a="http://schemas.openxmlformats.org/drawingml/2006/main" xmlns:r="http://schemas.openxmlformats.org/officeDocument/2006/relationships" xmlns:p="http://schemas.openxmlformats.org/presentationml/2006/main">
   <p:cSld>
     <p:spTree>
@@ -8199,464 +8291,6 @@
 </p:sld>
 </file>
 
-<file path=ppt/slides/slide25.xml><?xml version="1.0" encoding="utf-8"?>
-<p:sld xmlns:a="http://schemas.openxmlformats.org/drawingml/2006/main" xmlns:r="http://schemas.openxmlformats.org/officeDocument/2006/relationships" xmlns:p="http://schemas.openxmlformats.org/presentationml/2006/main">
-  <p:cSld>
-    <p:spTree>
-      <p:nvGrpSpPr>
-        <p:cNvPr id="1" name=""/>
-        <p:cNvGrpSpPr/>
-        <p:nvPr/>
-      </p:nvGrpSpPr>
-      <p:grpSpPr>
-        <a:xfrm>
-          <a:off x="0" y="0"/>
-          <a:ext cx="0" cy="0"/>
-          <a:chOff x="0" y="0"/>
-          <a:chExt cx="0" cy="0"/>
-        </a:xfrm>
-      </p:grpSpPr>
-      <p:sp>
-        <p:nvSpPr>
-          <p:cNvPr id="2" name="Title 1">
-            <a:extLst>
-              <a:ext uri="{FF2B5EF4-FFF2-40B4-BE49-F238E27FC236}">
-                <a16:creationId xmlns:a16="http://schemas.microsoft.com/office/drawing/2014/main" id="{D6AA89D5-560C-4369-A313-7C24EDF028A0}"/>
-              </a:ext>
-            </a:extLst>
-          </p:cNvPr>
-          <p:cNvSpPr>
-            <a:spLocks noGrp="1"/>
-          </p:cNvSpPr>
-          <p:nvPr>
-            <p:ph type="title"/>
-          </p:nvPr>
-        </p:nvSpPr>
-        <p:spPr/>
-        <p:txBody>
-          <a:bodyPr/>
-          <a:lstStyle/>
-          <a:p>
-            <a:pPr lvl="0" marL="0" indent="0">
-              <a:buNone/>
-            </a:pPr>
-            <a:r>
-              <a:rPr/>
-              <a:t>Bayesian</a:t>
-            </a:r>
-            <a:r>
-              <a:rPr/>
-              <a:t> </a:t>
-            </a:r>
-            <a:r>
-              <a:rPr/>
-              <a:t>estimation:</a:t>
-            </a:r>
-            <a:r>
-              <a:rPr/>
-              <a:t> </a:t>
-            </a:r>
-            <a:r>
-              <a:rPr/>
-              <a:t>Credible</a:t>
-            </a:r>
-            <a:r>
-              <a:rPr/>
-              <a:t> </a:t>
-            </a:r>
-            <a:r>
-              <a:rPr/>
-              <a:t>intervals</a:t>
-            </a:r>
-          </a:p>
-        </p:txBody>
-      </p:sp>
-      <mc:AlternateContent xmlns:mc="http://schemas.openxmlformats.org/markup-compatibility/2006">
-        <mc:Choice xmlns:a14="http://schemas.microsoft.com/office/drawing/2010/main" Requires="a14">
-          <p:sp>
-            <p:nvSpPr>
-              <p:cNvPr id="3" name="Content Placeholder 2">
-                <a:extLst>
-                  <a:ext uri="{FF2B5EF4-FFF2-40B4-BE49-F238E27FC236}">
-                    <a16:creationId xmlns:a16="http://schemas.microsoft.com/office/drawing/2014/main" id="{288BC91F-1C76-43AE-8B2A-956D48B768BE}"/>
-                  </a:ext>
-                </a:extLst>
-              </p:cNvPr>
-              <p:cNvSpPr>
-                <a:spLocks noGrp="1"/>
-              </p:cNvSpPr>
-              <p:nvPr>
-                <p:ph idx="1"/>
-              </p:nvPr>
-            </p:nvSpPr>
-            <p:spPr/>
-            <p:txBody>
-              <a:bodyPr/>
-              <a:lstStyle/>
-              <a:p>
-                <a:pPr lvl="0" marL="0" indent="0">
-                  <a:buNone/>
-                </a:pPr>
-                <a:r>
-                  <a:rPr b="1"/>
-                  <a:t>Highest posterior density (HPD) regions</a:t>
-                </a:r>
-              </a:p>
-              <a:p>
-                <a:pPr lvl="0" marL="0" indent="0">
-                  <a:buNone/>
-                </a:pPr>
-                <a:r>
-                  <a:rPr/>
-                  <a:t>A </a:t>
-                </a:r>
-                <a14:m>
-                  <m:oMath xmlns:m="http://schemas.openxmlformats.org/officeDocument/2006/math">
-                    <m:r>
-                      <m:t>100</m:t>
-                    </m:r>
-                    <m:r>
-                      <m:t>×</m:t>
-                    </m:r>
-                    <m:r>
-                      <m:t>(</m:t>
-                    </m:r>
-                    <m:r>
-                      <m:t>1</m:t>
-                    </m:r>
-                    <m:r>
-                      <m:t>−</m:t>
-                    </m:r>
-                    <m:r>
-                      <m:t>α</m:t>
-                    </m:r>
-                    <m:r>
-                      <m:t>)</m:t>
-                    </m:r>
-                    <m:r>
-                      <m:t>%</m:t>
-                    </m:r>
-                  </m:oMath>
-                </a14:m>
-                <a:r>
-                  <a:rPr/>
-                  <a:t> HPD region consists of a subset of the parameter space, </a:t>
-                </a:r>
-                <a14:m>
-                  <m:oMath xmlns:m="http://schemas.openxmlformats.org/officeDocument/2006/math">
-                    <m:r>
-                      <m:t>s</m:t>
-                    </m:r>
-                    <m:r>
-                      <m:t>(</m:t>
-                    </m:r>
-                    <m:r>
-                      <m:t>y</m:t>
-                    </m:r>
-                    <m:r>
-                      <m:t>)</m:t>
-                    </m:r>
-                    <m:r>
-                      <m:t>⊂</m:t>
-                    </m:r>
-                    <m:r>
-                      <m:t>Ω</m:t>
-                    </m:r>
-                  </m:oMath>
-                </a14:m>
-                <a:r>
-                  <a:rPr/>
-                  <a:t> such that</a:t>
-                </a:r>
-              </a:p>
-              <a:p>
-                <a:pPr lvl="1"/>
-                <a14:m>
-                  <m:oMath xmlns:m="http://schemas.openxmlformats.org/officeDocument/2006/math">
-                    <m:r>
-                      <m:t>P</m:t>
-                    </m:r>
-                    <m:r>
-                      <m:t>(</m:t>
-                    </m:r>
-                    <m:r>
-                      <m:t>θ</m:t>
-                    </m:r>
-                    <m:r>
-                      <m:t>∈</m:t>
-                    </m:r>
-                    <m:r>
-                      <m:t>s</m:t>
-                    </m:r>
-                    <m:r>
-                      <m:t>(</m:t>
-                    </m:r>
-                    <m:r>
-                      <m:t>y</m:t>
-                    </m:r>
-                    <m:r>
-                      <m:t>)</m:t>
-                    </m:r>
-                    <m:r>
-                      <m:t>|</m:t>
-                    </m:r>
-                    <m:r>
-                      <m:t>Y</m:t>
-                    </m:r>
-                    <m:r>
-                      <m:t>=</m:t>
-                    </m:r>
-                    <m:r>
-                      <m:t>y</m:t>
-                    </m:r>
-                    <m:r>
-                      <m:t>)</m:t>
-                    </m:r>
-                    <m:r>
-                      <m:t>=</m:t>
-                    </m:r>
-                    <m:r>
-                      <m:t>1</m:t>
-                    </m:r>
-                    <m:r>
-                      <m:t>−</m:t>
-                    </m:r>
-                    <m:r>
-                      <m:t>α</m:t>
-                    </m:r>
-                  </m:oMath>
-                </a14:m>
-                <a:r>
-                  <a:rPr/>
-                  <a:t>;</a:t>
-                </a:r>
-              </a:p>
-              <a:p>
-                <a:pPr lvl="1"/>
-                <a:r>
-                  <a:rPr/>
-                  <a:t>If </a:t>
-                </a:r>
-                <a14:m>
-                  <m:oMath xmlns:m="http://schemas.openxmlformats.org/officeDocument/2006/math">
-                    <m:sSub>
-                      <m:e>
-                        <m:r>
-                          <m:t>θ</m:t>
-                        </m:r>
-                      </m:e>
-                      <m:sub>
-                        <m:r>
-                          <m:t>a</m:t>
-                        </m:r>
-                      </m:sub>
-                    </m:sSub>
-                    <m:r>
-                      <m:t>∈</m:t>
-                    </m:r>
-                    <m:r>
-                      <m:t>s</m:t>
-                    </m:r>
-                    <m:r>
-                      <m:t>(</m:t>
-                    </m:r>
-                    <m:r>
-                      <m:t>y</m:t>
-                    </m:r>
-                    <m:r>
-                      <m:t>)</m:t>
-                    </m:r>
-                  </m:oMath>
-                </a14:m>
-                <a:r>
-                  <a:rPr/>
-                  <a:t>, </a:t>
-                </a:r>
-                <a14:m>
-                  <m:oMath xmlns:m="http://schemas.openxmlformats.org/officeDocument/2006/math">
-                    <m:sSub>
-                      <m:e>
-                        <m:r>
-                          <m:t>θ</m:t>
-                        </m:r>
-                      </m:e>
-                      <m:sub>
-                        <m:r>
-                          <m:t>b</m:t>
-                        </m:r>
-                      </m:sub>
-                    </m:sSub>
-                    <m:r>
-                      <m:t>∉</m:t>
-                    </m:r>
-                    <m:r>
-                      <m:t>s</m:t>
-                    </m:r>
-                    <m:r>
-                      <m:t>(</m:t>
-                    </m:r>
-                    <m:r>
-                      <m:t>y</m:t>
-                    </m:r>
-                    <m:r>
-                      <m:t>)</m:t>
-                    </m:r>
-                  </m:oMath>
-                </a14:m>
-                <a:r>
-                  <a:rPr/>
-                  <a:t>, then </a:t>
-                </a:r>
-                <a14:m>
-                  <m:oMath xmlns:m="http://schemas.openxmlformats.org/officeDocument/2006/math">
-                    <m:r>
-                      <m:t>p</m:t>
-                    </m:r>
-                    <m:r>
-                      <m:t>(</m:t>
-                    </m:r>
-                    <m:sSub>
-                      <m:e>
-                        <m:r>
-                          <m:t>θ</m:t>
-                        </m:r>
-                      </m:e>
-                      <m:sub>
-                        <m:r>
-                          <m:t>a</m:t>
-                        </m:r>
-                      </m:sub>
-                    </m:sSub>
-                    <m:r>
-                      <m:t>|</m:t>
-                    </m:r>
-                    <m:r>
-                      <m:t>y</m:t>
-                    </m:r>
-                    <m:r>
-                      <m:t>)</m:t>
-                    </m:r>
-                    <m:r>
-                      <m:t>≥</m:t>
-                    </m:r>
-                    <m:r>
-                      <m:t>p</m:t>
-                    </m:r>
-                    <m:r>
-                      <m:t>(</m:t>
-                    </m:r>
-                    <m:sSub>
-                      <m:e>
-                        <m:r>
-                          <m:t>θ</m:t>
-                        </m:r>
-                      </m:e>
-                      <m:sub>
-                        <m:r>
-                          <m:t>b</m:t>
-                        </m:r>
-                      </m:sub>
-                    </m:sSub>
-                    <m:r>
-                      <m:t>|</m:t>
-                    </m:r>
-                    <m:r>
-                      <m:t>y</m:t>
-                    </m:r>
-                    <m:r>
-                      <m:t>)</m:t>
-                    </m:r>
-                  </m:oMath>
-                </a14:m>
-                <a:r>
-                  <a:rPr/>
-                  <a:t>.</a:t>
-                </a:r>
-              </a:p>
-              <a:p>
-                <a:pPr lvl="0" marL="0" indent="0">
-                  <a:buNone/>
-                </a:pPr>
-                <a14:m>
-                  <m:oMathPara xmlns:m="http://schemas.openxmlformats.org/officeDocument/2006/math">
-                    <m:oMathParaPr>
-                      <m:jc m:val="center"/>
-                    </m:oMathParaPr>
-                    <m:oMath>
-                      <m:r>
-                        <m:t> </m:t>
-                      </m:r>
-                    </m:oMath>
-                  </m:oMathPara>
-                </a14:m>
-              </a:p>
-              <a:p>
-                <a:pPr lvl="0" marL="0" indent="0">
-                  <a:buNone/>
-                </a:pPr>
-                <a:r>
-                  <a:rPr/>
-                  <a:t>A HPD region is not necessarily an interval (e.g. for multi-modal distributions, the HPD region can consist of a union of distinct intervals).</a:t>
-                </a:r>
-              </a:p>
-              <a:p>
-                <a:pPr lvl="0" marL="0" indent="0">
-                  <a:buNone/>
-                </a:pPr>
-                <a:r>
-                  <a:rPr/>
-                  <a:t>If the HPD region is an interval, it is the </a:t>
-                </a:r>
-                <a:r>
-                  <a:rPr i="1"/>
-                  <a:t>narrowest</a:t>
-                </a:r>
-                <a:r>
-                  <a:rPr/>
-                  <a:t> interval with </a:t>
-                </a:r>
-                <a14:m>
-                  <m:oMath xmlns:m="http://schemas.openxmlformats.org/officeDocument/2006/math">
-                    <m:r>
-                      <m:t>100</m:t>
-                    </m:r>
-                    <m:r>
-                      <m:t>×</m:t>
-                    </m:r>
-                    <m:r>
-                      <m:t>(</m:t>
-                    </m:r>
-                    <m:r>
-                      <m:t>1</m:t>
-                    </m:r>
-                    <m:r>
-                      <m:t>−</m:t>
-                    </m:r>
-                    <m:r>
-                      <m:t>α</m:t>
-                    </m:r>
-                    <m:r>
-                      <m:t>)</m:t>
-                    </m:r>
-                    <m:r>
-                      <m:t>%</m:t>
-                    </m:r>
-                  </m:oMath>
-                </a14:m>
-                <a:r>
-                  <a:rPr/>
-                  <a:t> coverage.</a:t>
-                </a:r>
-              </a:p>
-            </p:txBody>
-          </p:sp>
-        </mc:Choice>
-      </mc:AlternateContent>
-    </p:spTree>
-  </p:cSld>
-</p:sld>
-</file>
-
 <file path=ppt/slides/slide26.xml><?xml version="1.0" encoding="utf-8"?>
 <p:sld xmlns:a="http://schemas.openxmlformats.org/drawingml/2006/main" xmlns:r="http://schemas.openxmlformats.org/officeDocument/2006/relationships" xmlns:p="http://schemas.openxmlformats.org/presentationml/2006/main">
   <p:cSld>
@@ -8726,22 +8360,6 @@
               <a:rPr/>
               <a:t>intervals</a:t>
             </a:r>
-            <a:r>
-              <a:rPr/>
-              <a:t> </a:t>
-            </a:r>
-            <a:r>
-              <a:rPr/>
-              <a:t>-</a:t>
-            </a:r>
-            <a:r>
-              <a:rPr/>
-              <a:t> </a:t>
-            </a:r>
-            <a:r>
-              <a:rPr/>
-              <a:t>example</a:t>
-            </a:r>
           </a:p>
         </p:txBody>
       </p:sp>
@@ -8772,20 +8390,235 @@
                   <a:buNone/>
                 </a:pPr>
                 <a:r>
-                  <a:rPr/>
-                  <a:t>Suppose the posterior distribution </a:t>
+                  <a:rPr b="1"/>
+                  <a:t>Highest posterior density (HPD) regions</a:t>
+                </a:r>
+              </a:p>
+              <a:p>
+                <a:pPr lvl="0" marL="0" indent="0">
+                  <a:buNone/>
+                </a:pPr>
+                <a:r>
+                  <a:rPr/>
+                  <a:t>A </a:t>
                 </a:r>
                 <a14:m>
                   <m:oMath xmlns:m="http://schemas.openxmlformats.org/officeDocument/2006/math">
                     <m:r>
+                      <m:t>100</m:t>
+                    </m:r>
+                    <m:r>
+                      <m:t>×</m:t>
+                    </m:r>
+                    <m:r>
+                      <m:t>(</m:t>
+                    </m:r>
+                    <m:r>
+                      <m:t>1</m:t>
+                    </m:r>
+                    <m:r>
+                      <m:t>−</m:t>
+                    </m:r>
+                    <m:r>
+                      <m:t>α</m:t>
+                    </m:r>
+                    <m:r>
+                      <m:t>)</m:t>
+                    </m:r>
+                    <m:r>
+                      <m:t>%</m:t>
+                    </m:r>
+                  </m:oMath>
+                </a14:m>
+                <a:r>
+                  <a:rPr/>
+                  <a:t> HPD region consists of a subset of the parameter space, </a:t>
+                </a:r>
+                <a14:m>
+                  <m:oMath xmlns:m="http://schemas.openxmlformats.org/officeDocument/2006/math">
+                    <m:r>
+                      <m:t>s</m:t>
+                    </m:r>
+                    <m:r>
+                      <m:t>(</m:t>
+                    </m:r>
+                    <m:r>
+                      <m:t>y</m:t>
+                    </m:r>
+                    <m:r>
+                      <m:t>)</m:t>
+                    </m:r>
+                    <m:r>
+                      <m:t>⊂</m:t>
+                    </m:r>
+                    <m:r>
+                      <m:t>Ω</m:t>
+                    </m:r>
+                  </m:oMath>
+                </a14:m>
+                <a:r>
+                  <a:rPr/>
+                  <a:t> such that</a:t>
+                </a:r>
+              </a:p>
+              <a:p>
+                <a:pPr lvl="1"/>
+                <a14:m>
+                  <m:oMath xmlns:m="http://schemas.openxmlformats.org/officeDocument/2006/math">
+                    <m:r>
+                      <m:t>P</m:t>
+                    </m:r>
+                    <m:r>
+                      <m:t>(</m:t>
+                    </m:r>
+                    <m:r>
+                      <m:t>θ</m:t>
+                    </m:r>
+                    <m:r>
+                      <m:t>∈</m:t>
+                    </m:r>
+                    <m:r>
+                      <m:t>s</m:t>
+                    </m:r>
+                    <m:r>
+                      <m:t>(</m:t>
+                    </m:r>
+                    <m:r>
+                      <m:t>y</m:t>
+                    </m:r>
+                    <m:r>
+                      <m:t>)</m:t>
+                    </m:r>
+                    <m:r>
+                      <m:t>|</m:t>
+                    </m:r>
+                    <m:r>
+                      <m:t>Y</m:t>
+                    </m:r>
+                    <m:r>
+                      <m:t>=</m:t>
+                    </m:r>
+                    <m:r>
+                      <m:t>y</m:t>
+                    </m:r>
+                    <m:r>
+                      <m:t>)</m:t>
+                    </m:r>
+                    <m:r>
+                      <m:t>=</m:t>
+                    </m:r>
+                    <m:r>
+                      <m:t>1</m:t>
+                    </m:r>
+                    <m:r>
+                      <m:t>−</m:t>
+                    </m:r>
+                    <m:r>
+                      <m:t>α</m:t>
+                    </m:r>
+                  </m:oMath>
+                </a14:m>
+                <a:r>
+                  <a:rPr/>
+                  <a:t>;</a:t>
+                </a:r>
+              </a:p>
+              <a:p>
+                <a:pPr lvl="1"/>
+                <a:r>
+                  <a:rPr/>
+                  <a:t>If </a:t>
+                </a:r>
+                <a14:m>
+                  <m:oMath xmlns:m="http://schemas.openxmlformats.org/officeDocument/2006/math">
+                    <m:sSub>
+                      <m:e>
+                        <m:r>
+                          <m:t>θ</m:t>
+                        </m:r>
+                      </m:e>
+                      <m:sub>
+                        <m:r>
+                          <m:t>a</m:t>
+                        </m:r>
+                      </m:sub>
+                    </m:sSub>
+                    <m:r>
+                      <m:t>∈</m:t>
+                    </m:r>
+                    <m:r>
+                      <m:t>s</m:t>
+                    </m:r>
+                    <m:r>
+                      <m:t>(</m:t>
+                    </m:r>
+                    <m:r>
+                      <m:t>y</m:t>
+                    </m:r>
+                    <m:r>
+                      <m:t>)</m:t>
+                    </m:r>
+                  </m:oMath>
+                </a14:m>
+                <a:r>
+                  <a:rPr/>
+                  <a:t>, </a:t>
+                </a:r>
+                <a14:m>
+                  <m:oMath xmlns:m="http://schemas.openxmlformats.org/officeDocument/2006/math">
+                    <m:sSub>
+                      <m:e>
+                        <m:r>
+                          <m:t>θ</m:t>
+                        </m:r>
+                      </m:e>
+                      <m:sub>
+                        <m:r>
+                          <m:t>b</m:t>
+                        </m:r>
+                      </m:sub>
+                    </m:sSub>
+                    <m:r>
+                      <m:t>∉</m:t>
+                    </m:r>
+                    <m:r>
+                      <m:t>s</m:t>
+                    </m:r>
+                    <m:r>
+                      <m:t>(</m:t>
+                    </m:r>
+                    <m:r>
+                      <m:t>y</m:t>
+                    </m:r>
+                    <m:r>
+                      <m:t>)</m:t>
+                    </m:r>
+                  </m:oMath>
+                </a14:m>
+                <a:r>
+                  <a:rPr/>
+                  <a:t>, then </a:t>
+                </a:r>
+                <a14:m>
+                  <m:oMath xmlns:m="http://schemas.openxmlformats.org/officeDocument/2006/math">
+                    <m:r>
                       <m:t>p</m:t>
                     </m:r>
                     <m:r>
                       <m:t>(</m:t>
                     </m:r>
-                    <m:r>
-                      <m:t>θ</m:t>
-                    </m:r>
+                    <m:sSub>
+                      <m:e>
+                        <m:r>
+                          <m:t>θ</m:t>
+                        </m:r>
+                      </m:e>
+                      <m:sub>
+                        <m:r>
+                          <m:t>a</m:t>
+                        </m:r>
+                      </m:sub>
+                    </m:sSub>
                     <m:r>
                       <m:t>|</m:t>
                     </m:r>
@@ -8795,25 +8628,32 @@
                     <m:r>
                       <m:t>)</m:t>
                     </m:r>
-                  </m:oMath>
-                </a14:m>
-                <a:r>
-                  <a:rPr/>
-                  <a:t> is Beta</a:t>
-                </a:r>
-                <a14:m>
-                  <m:oMath xmlns:m="http://schemas.openxmlformats.org/officeDocument/2006/math">
+                    <m:r>
+                      <m:t>≥</m:t>
+                    </m:r>
+                    <m:r>
+                      <m:t>p</m:t>
+                    </m:r>
                     <m:r>
                       <m:t>(</m:t>
                     </m:r>
-                    <m:r>
-                      <m:t>5</m:t>
-                    </m:r>
-                    <m:r>
-                      <m:t>,</m:t>
-                    </m:r>
-                    <m:r>
-                      <m:t>2</m:t>
+                    <m:sSub>
+                      <m:e>
+                        <m:r>
+                          <m:t>θ</m:t>
+                        </m:r>
+                      </m:e>
+                      <m:sub>
+                        <m:r>
+                          <m:t>b</m:t>
+                        </m:r>
+                      </m:sub>
+                    </m:sSub>
+                    <m:r>
+                      <m:t>|</m:t>
+                    </m:r>
+                    <m:r>
+                      <m:t>y</m:t>
                     </m:r>
                     <m:r>
                       <m:t>)</m:t>
@@ -8848,249 +8688,57 @@
                 </a:pPr>
                 <a:r>
                   <a:rPr/>
-                  <a:t>95% quantile-based interval:</a:t>
+                  <a:t>A HPD region is not necessarily an interval (e.g. for multi-modal distributions, the HPD region can consist of a union of distinct intervals).</a:t>
                 </a:r>
               </a:p>
               <a:p>
                 <a:pPr lvl="0" marL="0" indent="0">
                   <a:buNone/>
                 </a:pPr>
+                <a:r>
+                  <a:rPr/>
+                  <a:t>If the HPD region is an interval, it is the </a:t>
+                </a:r>
+                <a:r>
+                  <a:rPr i="1"/>
+                  <a:t>narrowest</a:t>
+                </a:r>
+                <a:r>
+                  <a:rPr/>
+                  <a:t> interval with </a:t>
+                </a:r>
                 <a14:m>
                   <m:oMath xmlns:m="http://schemas.openxmlformats.org/officeDocument/2006/math">
-                    <m:sSub>
-                      <m:e>
-                        <m:r>
-                          <m:t>q</m:t>
-                        </m:r>
-                      </m:e>
-                      <m:sub>
-                        <m:r>
-                          <m:t>0.025</m:t>
-                        </m:r>
-                        <m:r>
-                          <m:t>;</m:t>
-                        </m:r>
-                        <m:r>
-                          <m:t>β</m:t>
-                        </m:r>
-                        <m:r>
-                          <m:t>(</m:t>
-                        </m:r>
-                        <m:r>
-                          <m:t>5</m:t>
-                        </m:r>
-                        <m:r>
-                          <m:t>,</m:t>
-                        </m:r>
-                        <m:r>
-                          <m:t>2</m:t>
-                        </m:r>
-                        <m:r>
-                          <m:t>)</m:t>
-                        </m:r>
-                      </m:sub>
-                    </m:sSub>
-                    <m:r>
-                      <m:t>=</m:t>
-                    </m:r>
-                    <m:r>
-                      <m:t>0.3588</m:t>
+                    <m:r>
+                      <m:t>100</m:t>
+                    </m:r>
+                    <m:r>
+                      <m:t>×</m:t>
+                    </m:r>
+                    <m:r>
+                      <m:t>(</m:t>
+                    </m:r>
+                    <m:r>
+                      <m:t>1</m:t>
+                    </m:r>
+                    <m:r>
+                      <m:t>−</m:t>
+                    </m:r>
+                    <m:r>
+                      <m:t>α</m:t>
+                    </m:r>
+                    <m:r>
+                      <m:t>)</m:t>
+                    </m:r>
+                    <m:r>
+                      <m:t>%</m:t>
                     </m:r>
                   </m:oMath>
                 </a14:m>
                 <a:r>
                   <a:rPr/>
-                  <a:t> and </a:t>
-                </a:r>
-                <a14:m>
-                  <m:oMath xmlns:m="http://schemas.openxmlformats.org/officeDocument/2006/math">
-                    <m:sSub>
-                      <m:e>
-                        <m:r>
-                          <m:t>q</m:t>
-                        </m:r>
-                      </m:e>
-                      <m:sub>
-                        <m:r>
-                          <m:t>0.975</m:t>
-                        </m:r>
-                        <m:r>
-                          <m:t>;</m:t>
-                        </m:r>
-                        <m:r>
-                          <m:t>β</m:t>
-                        </m:r>
-                        <m:r>
-                          <m:t>(</m:t>
-                        </m:r>
-                        <m:r>
-                          <m:t>5</m:t>
-                        </m:r>
-                        <m:r>
-                          <m:t>,</m:t>
-                        </m:r>
-                        <m:r>
-                          <m:t>2</m:t>
-                        </m:r>
-                        <m:r>
-                          <m:t>)</m:t>
-                        </m:r>
-                      </m:sub>
-                    </m:sSub>
-                    <m:r>
-                      <m:t>=</m:t>
-                    </m:r>
-                    <m:r>
-                      <m:t>0.9567</m:t>
-                    </m:r>
-                  </m:oMath>
-                </a14:m>
-              </a:p>
-              <a:p>
-                <a:pPr lvl="0" marL="0" indent="0">
-                  <a:buNone/>
-                </a:pPr>
-                <a14:m>
-                  <m:oMathPara xmlns:m="http://schemas.openxmlformats.org/officeDocument/2006/math">
-                    <m:oMathParaPr>
-                      <m:jc m:val="center"/>
-                    </m:oMathParaPr>
-                    <m:oMath>
-                      <m:r>
-                        <m:t> </m:t>
-                      </m:r>
-                    </m:oMath>
-                  </m:oMathPara>
-                </a14:m>
-              </a:p>
-              <a:p>
-                <a:pPr lvl="0" marL="0" indent="0">
-                  <a:buNone/>
-                </a:pPr>
-                <a14:m>
-                  <m:oMathPara xmlns:m="http://schemas.openxmlformats.org/officeDocument/2006/math">
-                    <m:oMathParaPr>
-                      <m:jc m:val="center"/>
-                    </m:oMathParaPr>
-                    <m:oMath>
-                      <m:r>
-                        <m:t>⇒</m:t>
-                      </m:r>
-                      <m:r>
-                        <m:rPr>
-                          <m:sty m:val="p"/>
-                        </m:rPr>
-                        <m:t> 95% quantile-based interval </m:t>
-                      </m:r>
-                      <m:r>
-                        <m:t>=</m:t>
-                      </m:r>
-                      <m:r>
-                        <m:t>[</m:t>
-                      </m:r>
-                      <m:r>
-                        <m:t>0.3588</m:t>
-                      </m:r>
-                      <m:r>
-                        <m:t>,</m:t>
-                      </m:r>
-                      <m:r>
-                        <m:t>0.9567</m:t>
-                      </m:r>
-                      <m:r>
-                        <m:t>]</m:t>
-                      </m:r>
-                    </m:oMath>
-                  </m:oMathPara>
-                </a14:m>
-              </a:p>
-              <a:p>
-                <a:pPr lvl="0" marL="0" indent="0">
-                  <a:buNone/>
-                </a:pPr>
-                <a:r>
-                  <a:rPr/>
-                  <a:t>The width of this interval is </a:t>
-                </a:r>
-                <a14:m>
-                  <m:oMath xmlns:m="http://schemas.openxmlformats.org/officeDocument/2006/math">
-                    <m:sSub>
-                      <m:e>
-                        <m:r>
-                          <m:t>q</m:t>
-                        </m:r>
-                      </m:e>
-                      <m:sub>
-                        <m:r>
-                          <m:t>0.975</m:t>
-                        </m:r>
-                        <m:r>
-                          <m:t>;</m:t>
-                        </m:r>
-                        <m:r>
-                          <m:t>β</m:t>
-                        </m:r>
-                        <m:r>
-                          <m:t>(</m:t>
-                        </m:r>
-                        <m:r>
-                          <m:t>5</m:t>
-                        </m:r>
-                        <m:r>
-                          <m:t>,</m:t>
-                        </m:r>
-                        <m:r>
-                          <m:t>2</m:t>
-                        </m:r>
-                        <m:r>
-                          <m:t>)</m:t>
-                        </m:r>
-                      </m:sub>
-                    </m:sSub>
-                    <m:r>
-                      <m:t>−</m:t>
-                    </m:r>
-                    <m:sSub>
-                      <m:e>
-                        <m:r>
-                          <m:t>q</m:t>
-                        </m:r>
-                      </m:e>
-                      <m:sub>
-                        <m:r>
-                          <m:t>0.025</m:t>
-                        </m:r>
-                        <m:r>
-                          <m:t>;</m:t>
-                        </m:r>
-                        <m:r>
-                          <m:t>β</m:t>
-                        </m:r>
-                        <m:r>
-                          <m:t>(</m:t>
-                        </m:r>
-                        <m:r>
-                          <m:t>5</m:t>
-                        </m:r>
-                        <m:r>
-                          <m:t>,</m:t>
-                        </m:r>
-                        <m:r>
-                          <m:t>2</m:t>
-                        </m:r>
-                        <m:r>
-                          <m:t>)</m:t>
-                        </m:r>
-                      </m:sub>
-                    </m:sSub>
-                    <m:r>
-                      <m:t>=</m:t>
-                    </m:r>
-                    <m:r>
-                      <m:t>0.5980</m:t>
-                    </m:r>
-                  </m:oMath>
-                </a14:m>
+                  <a:t> coverage.</a:t>
+                </a:r>
               </a:p>
             </p:txBody>
           </p:sp>
@@ -9292,47 +8940,103 @@
                 </a:pPr>
                 <a:r>
                   <a:rPr/>
-                  <a:t>95% HPD interval:</a:t>
+                  <a:t>95% quantile-based interval:</a:t>
                 </a:r>
               </a:p>
               <a:p>
                 <a:pPr lvl="0" marL="0" indent="0">
                   <a:buNone/>
                 </a:pPr>
-                <a:r>
-                  <a:rPr/>
-                  <a:t>There’s no formula to find this; has to be found empirically by sliding a line down the y-axis on a graph of the density. In </a:t>
-                </a:r>
-                <a:r>
-                  <a:rPr sz="1800">
-                    <a:latin typeface="Courier"/>
-                  </a:rPr>
-                  <a:t>R</a:t>
-                </a:r>
-                <a:r>
-                  <a:rPr/>
-                  <a:t>, you can use the function </a:t>
-                </a:r>
-                <a:r>
-                  <a:rPr sz="1800">
-                    <a:latin typeface="Courier"/>
-                  </a:rPr>
-                  <a:t>hdi()</a:t>
-                </a:r>
-                <a:r>
-                  <a:rPr/>
-                  <a:t> from the </a:t>
-                </a:r>
-                <a:r>
-                  <a:rPr sz="1800">
-                    <a:latin typeface="Courier"/>
-                  </a:rPr>
-                  <a:t>HDInterval</a:t>
-                </a:r>
-                <a:r>
-                  <a:rPr/>
-                  <a:t> package (for example).</a:t>
-                </a:r>
+                <a14:m>
+                  <m:oMath xmlns:m="http://schemas.openxmlformats.org/officeDocument/2006/math">
+                    <m:sSub>
+                      <m:e>
+                        <m:r>
+                          <m:t>q</m:t>
+                        </m:r>
+                      </m:e>
+                      <m:sub>
+                        <m:r>
+                          <m:t>0.025</m:t>
+                        </m:r>
+                        <m:r>
+                          <m:t>;</m:t>
+                        </m:r>
+                        <m:r>
+                          <m:t>β</m:t>
+                        </m:r>
+                        <m:r>
+                          <m:t>(</m:t>
+                        </m:r>
+                        <m:r>
+                          <m:t>5</m:t>
+                        </m:r>
+                        <m:r>
+                          <m:t>,</m:t>
+                        </m:r>
+                        <m:r>
+                          <m:t>2</m:t>
+                        </m:r>
+                        <m:r>
+                          <m:t>)</m:t>
+                        </m:r>
+                      </m:sub>
+                    </m:sSub>
+                    <m:r>
+                      <m:t>=</m:t>
+                    </m:r>
+                    <m:r>
+                      <m:t>0.3588</m:t>
+                    </m:r>
+                  </m:oMath>
+                </a14:m>
+                <a:r>
+                  <a:rPr/>
+                  <a:t> and </a:t>
+                </a:r>
+                <a14:m>
+                  <m:oMath xmlns:m="http://schemas.openxmlformats.org/officeDocument/2006/math">
+                    <m:sSub>
+                      <m:e>
+                        <m:r>
+                          <m:t>q</m:t>
+                        </m:r>
+                      </m:e>
+                      <m:sub>
+                        <m:r>
+                          <m:t>0.975</m:t>
+                        </m:r>
+                        <m:r>
+                          <m:t>;</m:t>
+                        </m:r>
+                        <m:r>
+                          <m:t>β</m:t>
+                        </m:r>
+                        <m:r>
+                          <m:t>(</m:t>
+                        </m:r>
+                        <m:r>
+                          <m:t>5</m:t>
+                        </m:r>
+                        <m:r>
+                          <m:t>,</m:t>
+                        </m:r>
+                        <m:r>
+                          <m:t>2</m:t>
+                        </m:r>
+                        <m:r>
+                          <m:t>)</m:t>
+                        </m:r>
+                      </m:sub>
+                    </m:sSub>
+                    <m:r>
+                      <m:t>=</m:t>
+                    </m:r>
+                    <m:r>
+                      <m:t>0.9567</m:t>
+                    </m:r>
+                  </m:oMath>
+                </a14:m>
               </a:p>
               <a:p>
                 <a:pPr lvl="0" marL="0" indent="0">
@@ -9368,7 +9072,7 @@
                         <m:rPr>
                           <m:sty m:val="p"/>
                         </m:rPr>
-                        <m:t> 95% HPD interval </m:t>
+                        <m:t> 95% quantile-based interval </m:t>
                       </m:r>
                       <m:r>
                         <m:t>=</m:t>
@@ -9377,13 +9081,13 @@
                         <m:t>[</m:t>
                       </m:r>
                       <m:r>
-                        <m:t>0.4094</m:t>
+                        <m:t>0.3588</m:t>
                       </m:r>
                       <m:r>
                         <m:t>,</m:t>
                       </m:r>
                       <m:r>
-                        <m:t>0.9822</m:t>
+                        <m:t>0.9567</m:t>
                       </m:r>
                       <m:r>
                         <m:t>]</m:t>
@@ -9402,36 +9106,83 @@
                 </a:r>
                 <a14:m>
                   <m:oMath xmlns:m="http://schemas.openxmlformats.org/officeDocument/2006/math">
-                    <m:r>
-                      <m:t>0.9822</m:t>
-                    </m:r>
+                    <m:sSub>
+                      <m:e>
+                        <m:r>
+                          <m:t>q</m:t>
+                        </m:r>
+                      </m:e>
+                      <m:sub>
+                        <m:r>
+                          <m:t>0.975</m:t>
+                        </m:r>
+                        <m:r>
+                          <m:t>;</m:t>
+                        </m:r>
+                        <m:r>
+                          <m:t>β</m:t>
+                        </m:r>
+                        <m:r>
+                          <m:t>(</m:t>
+                        </m:r>
+                        <m:r>
+                          <m:t>5</m:t>
+                        </m:r>
+                        <m:r>
+                          <m:t>,</m:t>
+                        </m:r>
+                        <m:r>
+                          <m:t>2</m:t>
+                        </m:r>
+                        <m:r>
+                          <m:t>)</m:t>
+                        </m:r>
+                      </m:sub>
+                    </m:sSub>
                     <m:r>
                       <m:t>−</m:t>
                     </m:r>
-                    <m:r>
-                      <m:t>0.4094</m:t>
-                    </m:r>
+                    <m:sSub>
+                      <m:e>
+                        <m:r>
+                          <m:t>q</m:t>
+                        </m:r>
+                      </m:e>
+                      <m:sub>
+                        <m:r>
+                          <m:t>0.025</m:t>
+                        </m:r>
+                        <m:r>
+                          <m:t>;</m:t>
+                        </m:r>
+                        <m:r>
+                          <m:t>β</m:t>
+                        </m:r>
+                        <m:r>
+                          <m:t>(</m:t>
+                        </m:r>
+                        <m:r>
+                          <m:t>5</m:t>
+                        </m:r>
+                        <m:r>
+                          <m:t>,</m:t>
+                        </m:r>
+                        <m:r>
+                          <m:t>2</m:t>
+                        </m:r>
+                        <m:r>
+                          <m:t>)</m:t>
+                        </m:r>
+                      </m:sub>
+                    </m:sSub>
                     <m:r>
                       <m:t>=</m:t>
                     </m:r>
                     <m:r>
-                      <m:t>0.5728</m:t>
+                      <m:t>0.5980</m:t>
                     </m:r>
                   </m:oMath>
                 </a14:m>
-                <a:r>
-                  <a:rPr/>
-                  <a:t>.</a:t>
-                </a:r>
-              </a:p>
-              <a:p>
-                <a:pPr lvl="0" marL="0" indent="0">
-                  <a:buNone/>
-                </a:pPr>
-                <a:r>
-                  <a:rPr/>
-                  <a:t>Note that this is (slightly) narrower than the quantile-based interval.</a:t>
-                </a:r>
               </a:p>
             </p:txBody>
           </p:sp>
@@ -9530,6 +9281,347 @@
           </a:p>
         </p:txBody>
       </p:sp>
+      <mc:AlternateContent xmlns:mc="http://schemas.openxmlformats.org/markup-compatibility/2006">
+        <mc:Choice xmlns:a14="http://schemas.microsoft.com/office/drawing/2010/main" Requires="a14">
+          <p:sp>
+            <p:nvSpPr>
+              <p:cNvPr id="3" name="Content Placeholder 2">
+                <a:extLst>
+                  <a:ext uri="{FF2B5EF4-FFF2-40B4-BE49-F238E27FC236}">
+                    <a16:creationId xmlns:a16="http://schemas.microsoft.com/office/drawing/2014/main" id="{288BC91F-1C76-43AE-8B2A-956D48B768BE}"/>
+                  </a:ext>
+                </a:extLst>
+              </p:cNvPr>
+              <p:cNvSpPr>
+                <a:spLocks noGrp="1"/>
+              </p:cNvSpPr>
+              <p:nvPr>
+                <p:ph idx="1"/>
+              </p:nvPr>
+            </p:nvSpPr>
+            <p:spPr/>
+            <p:txBody>
+              <a:bodyPr/>
+              <a:lstStyle/>
+              <a:p>
+                <a:pPr lvl="0" marL="0" indent="0">
+                  <a:buNone/>
+                </a:pPr>
+                <a:r>
+                  <a:rPr/>
+                  <a:t>Suppose the posterior distribution </a:t>
+                </a:r>
+                <a14:m>
+                  <m:oMath xmlns:m="http://schemas.openxmlformats.org/officeDocument/2006/math">
+                    <m:r>
+                      <m:t>p</m:t>
+                    </m:r>
+                    <m:r>
+                      <m:t>(</m:t>
+                    </m:r>
+                    <m:r>
+                      <m:t>θ</m:t>
+                    </m:r>
+                    <m:r>
+                      <m:t>|</m:t>
+                    </m:r>
+                    <m:r>
+                      <m:t>y</m:t>
+                    </m:r>
+                    <m:r>
+                      <m:t>)</m:t>
+                    </m:r>
+                  </m:oMath>
+                </a14:m>
+                <a:r>
+                  <a:rPr/>
+                  <a:t> is Beta</a:t>
+                </a:r>
+                <a14:m>
+                  <m:oMath xmlns:m="http://schemas.openxmlformats.org/officeDocument/2006/math">
+                    <m:r>
+                      <m:t>(</m:t>
+                    </m:r>
+                    <m:r>
+                      <m:t>5</m:t>
+                    </m:r>
+                    <m:r>
+                      <m:t>,</m:t>
+                    </m:r>
+                    <m:r>
+                      <m:t>2</m:t>
+                    </m:r>
+                    <m:r>
+                      <m:t>)</m:t>
+                    </m:r>
+                  </m:oMath>
+                </a14:m>
+                <a:r>
+                  <a:rPr/>
+                  <a:t>.</a:t>
+                </a:r>
+              </a:p>
+              <a:p>
+                <a:pPr lvl="0" marL="0" indent="0">
+                  <a:buNone/>
+                </a:pPr>
+                <a14:m>
+                  <m:oMathPara xmlns:m="http://schemas.openxmlformats.org/officeDocument/2006/math">
+                    <m:oMathParaPr>
+                      <m:jc m:val="center"/>
+                    </m:oMathParaPr>
+                    <m:oMath>
+                      <m:r>
+                        <m:t> </m:t>
+                      </m:r>
+                    </m:oMath>
+                  </m:oMathPara>
+                </a14:m>
+              </a:p>
+              <a:p>
+                <a:pPr lvl="0" marL="0" indent="0">
+                  <a:buNone/>
+                </a:pPr>
+                <a:r>
+                  <a:rPr/>
+                  <a:t>95% HPD interval:</a:t>
+                </a:r>
+              </a:p>
+              <a:p>
+                <a:pPr lvl="0" marL="0" indent="0">
+                  <a:buNone/>
+                </a:pPr>
+                <a:r>
+                  <a:rPr/>
+                  <a:t>There’s no formula to find this; has to be found empirically by sliding a line down the y-axis on a graph of the density. In </a:t>
+                </a:r>
+                <a:r>
+                  <a:rPr sz="1800">
+                    <a:latin typeface="Courier"/>
+                  </a:rPr>
+                  <a:t>R</a:t>
+                </a:r>
+                <a:r>
+                  <a:rPr/>
+                  <a:t>, you can use the function </a:t>
+                </a:r>
+                <a:r>
+                  <a:rPr sz="1800">
+                    <a:latin typeface="Courier"/>
+                  </a:rPr>
+                  <a:t>hdi()</a:t>
+                </a:r>
+                <a:r>
+                  <a:rPr/>
+                  <a:t> from the </a:t>
+                </a:r>
+                <a:r>
+                  <a:rPr sz="1800">
+                    <a:latin typeface="Courier"/>
+                  </a:rPr>
+                  <a:t>HDInterval</a:t>
+                </a:r>
+                <a:r>
+                  <a:rPr/>
+                  <a:t> package (for example).</a:t>
+                </a:r>
+              </a:p>
+              <a:p>
+                <a:pPr lvl="0" marL="0" indent="0">
+                  <a:buNone/>
+                </a:pPr>
+                <a14:m>
+                  <m:oMathPara xmlns:m="http://schemas.openxmlformats.org/officeDocument/2006/math">
+                    <m:oMathParaPr>
+                      <m:jc m:val="center"/>
+                    </m:oMathParaPr>
+                    <m:oMath>
+                      <m:r>
+                        <m:t> </m:t>
+                      </m:r>
+                    </m:oMath>
+                  </m:oMathPara>
+                </a14:m>
+              </a:p>
+              <a:p>
+                <a:pPr lvl="0" marL="0" indent="0">
+                  <a:buNone/>
+                </a:pPr>
+                <a14:m>
+                  <m:oMathPara xmlns:m="http://schemas.openxmlformats.org/officeDocument/2006/math">
+                    <m:oMathParaPr>
+                      <m:jc m:val="center"/>
+                    </m:oMathParaPr>
+                    <m:oMath>
+                      <m:r>
+                        <m:t>⇒</m:t>
+                      </m:r>
+                      <m:r>
+                        <m:rPr>
+                          <m:sty m:val="p"/>
+                        </m:rPr>
+                        <m:t> 95% HPD interval </m:t>
+                      </m:r>
+                      <m:r>
+                        <m:t>=</m:t>
+                      </m:r>
+                      <m:r>
+                        <m:t>[</m:t>
+                      </m:r>
+                      <m:r>
+                        <m:t>0.4094</m:t>
+                      </m:r>
+                      <m:r>
+                        <m:t>,</m:t>
+                      </m:r>
+                      <m:r>
+                        <m:t>0.9822</m:t>
+                      </m:r>
+                      <m:r>
+                        <m:t>]</m:t>
+                      </m:r>
+                    </m:oMath>
+                  </m:oMathPara>
+                </a14:m>
+              </a:p>
+              <a:p>
+                <a:pPr lvl="0" marL="0" indent="0">
+                  <a:buNone/>
+                </a:pPr>
+                <a:r>
+                  <a:rPr/>
+                  <a:t>The width of this interval is </a:t>
+                </a:r>
+                <a14:m>
+                  <m:oMath xmlns:m="http://schemas.openxmlformats.org/officeDocument/2006/math">
+                    <m:r>
+                      <m:t>0.9822</m:t>
+                    </m:r>
+                    <m:r>
+                      <m:t>−</m:t>
+                    </m:r>
+                    <m:r>
+                      <m:t>0.4094</m:t>
+                    </m:r>
+                    <m:r>
+                      <m:t>=</m:t>
+                    </m:r>
+                    <m:r>
+                      <m:t>0.5728</m:t>
+                    </m:r>
+                  </m:oMath>
+                </a14:m>
+                <a:r>
+                  <a:rPr/>
+                  <a:t>.</a:t>
+                </a:r>
+              </a:p>
+              <a:p>
+                <a:pPr lvl="0" marL="0" indent="0">
+                  <a:buNone/>
+                </a:pPr>
+                <a:r>
+                  <a:rPr/>
+                  <a:t>Note that this is (slightly) narrower than the quantile-based interval.</a:t>
+                </a:r>
+              </a:p>
+            </p:txBody>
+          </p:sp>
+        </mc:Choice>
+      </mc:AlternateContent>
+    </p:spTree>
+  </p:cSld>
+</p:sld>
+</file>
+
+<file path=ppt/slides/slide29.xml><?xml version="1.0" encoding="utf-8"?>
+<p:sld xmlns:a="http://schemas.openxmlformats.org/drawingml/2006/main" xmlns:r="http://schemas.openxmlformats.org/officeDocument/2006/relationships" xmlns:p="http://schemas.openxmlformats.org/presentationml/2006/main">
+  <p:cSld>
+    <p:spTree>
+      <p:nvGrpSpPr>
+        <p:cNvPr id="1" name=""/>
+        <p:cNvGrpSpPr/>
+        <p:nvPr/>
+      </p:nvGrpSpPr>
+      <p:grpSpPr>
+        <a:xfrm>
+          <a:off x="0" y="0"/>
+          <a:ext cx="0" cy="0"/>
+          <a:chOff x="0" y="0"/>
+          <a:chExt cx="0" cy="0"/>
+        </a:xfrm>
+      </p:grpSpPr>
+      <p:sp>
+        <p:nvSpPr>
+          <p:cNvPr id="2" name="Title 1">
+            <a:extLst>
+              <a:ext uri="{FF2B5EF4-FFF2-40B4-BE49-F238E27FC236}">
+                <a16:creationId xmlns:a16="http://schemas.microsoft.com/office/drawing/2014/main" id="{D6AA89D5-560C-4369-A313-7C24EDF028A0}"/>
+              </a:ext>
+            </a:extLst>
+          </p:cNvPr>
+          <p:cNvSpPr>
+            <a:spLocks noGrp="1"/>
+          </p:cNvSpPr>
+          <p:nvPr>
+            <p:ph type="title"/>
+          </p:nvPr>
+        </p:nvSpPr>
+        <p:spPr/>
+        <p:txBody>
+          <a:bodyPr/>
+          <a:lstStyle/>
+          <a:p>
+            <a:pPr lvl="0" marL="0" indent="0">
+              <a:buNone/>
+            </a:pPr>
+            <a:r>
+              <a:rPr/>
+              <a:t>Bayesian</a:t>
+            </a:r>
+            <a:r>
+              <a:rPr/>
+              <a:t> </a:t>
+            </a:r>
+            <a:r>
+              <a:rPr/>
+              <a:t>estimation:</a:t>
+            </a:r>
+            <a:r>
+              <a:rPr/>
+              <a:t> </a:t>
+            </a:r>
+            <a:r>
+              <a:rPr/>
+              <a:t>Credible</a:t>
+            </a:r>
+            <a:r>
+              <a:rPr/>
+              <a:t> </a:t>
+            </a:r>
+            <a:r>
+              <a:rPr/>
+              <a:t>intervals</a:t>
+            </a:r>
+            <a:r>
+              <a:rPr/>
+              <a:t> </a:t>
+            </a:r>
+            <a:r>
+              <a:rPr/>
+              <a:t>-</a:t>
+            </a:r>
+            <a:r>
+              <a:rPr/>
+              <a:t> </a:t>
+            </a:r>
+            <a:r>
+              <a:rPr/>
+              <a:t>example</a:t>
+            </a:r>
+          </a:p>
+        </p:txBody>
+      </p:sp>
       <p:pic>
         <p:nvPicPr>
           <p:cNvPr descr="Chanco_STA6206_BDA_2019_Henrion_Session3_files/figure-pptx/unnamed-chunk-2-1.png" id="0" name="Picture 1"/>
@@ -9565,7 +9657,177 @@
 </p:sld>
 </file>
 
-<file path=ppt/slides/slide29.xml><?xml version="1.0" encoding="utf-8"?>
+<file path=ppt/slides/slide3.xml><?xml version="1.0" encoding="utf-8"?>
+<p:sld xmlns:a="http://schemas.openxmlformats.org/drawingml/2006/main" xmlns:r="http://schemas.openxmlformats.org/officeDocument/2006/relationships" xmlns:p="http://schemas.openxmlformats.org/presentationml/2006/main">
+  <p:cSld>
+    <p:spTree>
+      <p:nvGrpSpPr>
+        <p:cNvPr id="1" name=""/>
+        <p:cNvGrpSpPr/>
+        <p:nvPr/>
+      </p:nvGrpSpPr>
+      <p:grpSpPr>
+        <a:xfrm>
+          <a:off x="0" y="0"/>
+          <a:ext cx="0" cy="0"/>
+          <a:chOff x="0" y="0"/>
+          <a:chExt cx="0" cy="0"/>
+        </a:xfrm>
+      </p:grpSpPr>
+      <mc:AlternateContent xmlns:mc="http://schemas.openxmlformats.org/markup-compatibility/2006">
+        <mc:Choice xmlns:a14="http://schemas.microsoft.com/office/drawing/2010/main" Requires="a14">
+          <p:sp>
+            <p:nvSpPr>
+              <p:cNvPr id="3" name="Content Placeholder 2">
+                <a:extLst>
+                  <a:ext uri="{FF2B5EF4-FFF2-40B4-BE49-F238E27FC236}">
+                    <a16:creationId xmlns:a16="http://schemas.microsoft.com/office/drawing/2014/main" id="{288BC91F-1C76-43AE-8B2A-956D48B768BE}"/>
+                  </a:ext>
+                </a:extLst>
+              </p:cNvPr>
+              <p:cNvSpPr>
+                <a:spLocks noGrp="1"/>
+              </p:cNvSpPr>
+              <p:nvPr>
+                <p:ph idx="1"/>
+              </p:nvPr>
+            </p:nvSpPr>
+            <p:spPr/>
+            <p:txBody>
+              <a:bodyPr/>
+              <a:lstStyle/>
+              <a:p>
+                <a:pPr lvl="0" marL="0" indent="0">
+                  <a:spcBef>
+                    <a:spcPts val="3000"/>
+                  </a:spcBef>
+                  <a:buNone/>
+                </a:pPr>
+                <a:r>
+                  <a:rPr b="1"/>
+                  <a:t>Session 3: Bayesian estimation</a:t>
+                </a:r>
+              </a:p>
+              <a:p>
+                <a:pPr lvl="0" marL="0" indent="0">
+                  <a:buNone/>
+                </a:pPr>
+                <a14:m>
+                  <m:oMathPara xmlns:m="http://schemas.openxmlformats.org/officeDocument/2006/math">
+                    <m:oMathParaPr>
+                      <m:jc m:val="center"/>
+                    </m:oMathParaPr>
+                    <m:oMath>
+                      <m:r>
+                        <m:t> </m:t>
+                      </m:r>
+                    </m:oMath>
+                  </m:oMathPara>
+                </a14:m>
+              </a:p>
+              <a:p>
+                <a:pPr lvl="0" marL="0" indent="0">
+                  <a:buNone/>
+                </a:pPr>
+                <a:r>
+                  <a:rPr/>
+                  <a:t>Some references for Bayesian statistics / data analysis are:</a:t>
+                </a:r>
+              </a:p>
+              <a:p>
+                <a:pPr lvl="1">
+                  <a:buAutoNum type="arabicPeriod"/>
+                </a:pPr>
+                <a:r>
+                  <a:rPr/>
+                  <a:t>Hoff, P.D. (2009). “</a:t>
+                </a:r>
+                <a:r>
+                  <a:rPr i="1"/>
+                  <a:t>A First Course in Bayesian Statistical Methods</a:t>
+                </a:r>
+                <a:r>
+                  <a:rPr/>
+                  <a:t>.” Springer.</a:t>
+                </a:r>
+              </a:p>
+              <a:p>
+                <a:pPr lvl="1">
+                  <a:buAutoNum type="arabicPeriod"/>
+                </a:pPr>
+                <a:r>
+                  <a:rPr/>
+                  <a:t>Gelman, A., Carlin, J.B., Stern, H.S., Dunson, D.B., Vehtari, A., Rubin, D.B. (2014). “</a:t>
+                </a:r>
+                <a:r>
+                  <a:rPr i="1"/>
+                  <a:t>Bayesian Data Analysis</a:t>
+                </a:r>
+                <a:r>
+                  <a:rPr/>
+                  <a:t>”. 3</a:t>
+                </a:r>
+                <a:r>
+                  <a:rPr baseline="30000"/>
+                  <a:t>rd</a:t>
+                </a:r>
+                <a:r>
+                  <a:rPr/>
+                  <a:t> ed. CRC Press.</a:t>
+                </a:r>
+              </a:p>
+              <a:p>
+                <a:pPr lvl="1">
+                  <a:buAutoNum type="arabicPeriod"/>
+                </a:pPr>
+                <a:r>
+                  <a:rPr/>
+                  <a:t>Ramoni, M., Sebastiani, P. (2007), ‘Bayesian Methods’, in Berthold, M., Hand, D.J. (eds.). “</a:t>
+                </a:r>
+                <a:r>
+                  <a:rPr i="1"/>
+                  <a:t>Intelligent Data Analysis</a:t>
+                </a:r>
+                <a:r>
+                  <a:rPr/>
+                  <a:t>”, 2</a:t>
+                </a:r>
+                <a:r>
+                  <a:rPr baseline="30000"/>
+                  <a:t>nd</a:t>
+                </a:r>
+                <a:r>
+                  <a:rPr/>
+                  <a:t> ed., Springer, pp.131-168</a:t>
+                </a:r>
+              </a:p>
+              <a:p>
+                <a:pPr lvl="1">
+                  <a:buAutoNum type="arabicPeriod"/>
+                </a:pPr>
+                <a:r>
+                  <a:rPr/>
+                  <a:t>Stone, J.V. (2013). “</a:t>
+                </a:r>
+                <a:r>
+                  <a:rPr i="1"/>
+                  <a:t>Bayes’ Rule: A Tutorial Introduction to Bayesian Analysis</a:t>
+                </a:r>
+                <a:r>
+                  <a:rPr/>
+                  <a:t>”. Sebtel Press.</a:t>
+                </a:r>
+              </a:p>
+            </p:txBody>
+          </p:sp>
+        </mc:Choice>
+      </mc:AlternateContent>
+    </p:spTree>
+  </p:cSld>
+</p:sld>
+</file>
+
+<file path=ppt/slides/slide30.xml><?xml version="1.0" encoding="utf-8"?>
 <p:sld xmlns:a="http://schemas.openxmlformats.org/drawingml/2006/main" xmlns:r="http://schemas.openxmlformats.org/officeDocument/2006/relationships" xmlns:p="http://schemas.openxmlformats.org/presentationml/2006/main">
   <p:cSld>
     <p:spTree>
@@ -10287,177 +10549,7 @@
 </p:sld>
 </file>
 
-<file path=ppt/slides/slide3.xml><?xml version="1.0" encoding="utf-8"?>
-<p:sld xmlns:a="http://schemas.openxmlformats.org/drawingml/2006/main" xmlns:r="http://schemas.openxmlformats.org/officeDocument/2006/relationships" xmlns:p="http://schemas.openxmlformats.org/presentationml/2006/main">
-  <p:cSld>
-    <p:spTree>
-      <p:nvGrpSpPr>
-        <p:cNvPr id="1" name=""/>
-        <p:cNvGrpSpPr/>
-        <p:nvPr/>
-      </p:nvGrpSpPr>
-      <p:grpSpPr>
-        <a:xfrm>
-          <a:off x="0" y="0"/>
-          <a:ext cx="0" cy="0"/>
-          <a:chOff x="0" y="0"/>
-          <a:chExt cx="0" cy="0"/>
-        </a:xfrm>
-      </p:grpSpPr>
-      <mc:AlternateContent xmlns:mc="http://schemas.openxmlformats.org/markup-compatibility/2006">
-        <mc:Choice xmlns:a14="http://schemas.microsoft.com/office/drawing/2010/main" Requires="a14">
-          <p:sp>
-            <p:nvSpPr>
-              <p:cNvPr id="3" name="Content Placeholder 2">
-                <a:extLst>
-                  <a:ext uri="{FF2B5EF4-FFF2-40B4-BE49-F238E27FC236}">
-                    <a16:creationId xmlns:a16="http://schemas.microsoft.com/office/drawing/2014/main" id="{288BC91F-1C76-43AE-8B2A-956D48B768BE}"/>
-                  </a:ext>
-                </a:extLst>
-              </p:cNvPr>
-              <p:cNvSpPr>
-                <a:spLocks noGrp="1"/>
-              </p:cNvSpPr>
-              <p:nvPr>
-                <p:ph idx="1"/>
-              </p:nvPr>
-            </p:nvSpPr>
-            <p:spPr/>
-            <p:txBody>
-              <a:bodyPr/>
-              <a:lstStyle/>
-              <a:p>
-                <a:pPr lvl="0" marL="0" indent="0">
-                  <a:spcBef>
-                    <a:spcPts val="3000"/>
-                  </a:spcBef>
-                  <a:buNone/>
-                </a:pPr>
-                <a:r>
-                  <a:rPr b="1"/>
-                  <a:t>Session 3: Bayesian estimation</a:t>
-                </a:r>
-              </a:p>
-              <a:p>
-                <a:pPr lvl="0" marL="0" indent="0">
-                  <a:buNone/>
-                </a:pPr>
-                <a14:m>
-                  <m:oMathPara xmlns:m="http://schemas.openxmlformats.org/officeDocument/2006/math">
-                    <m:oMathParaPr>
-                      <m:jc m:val="center"/>
-                    </m:oMathParaPr>
-                    <m:oMath>
-                      <m:r>
-                        <m:t> </m:t>
-                      </m:r>
-                    </m:oMath>
-                  </m:oMathPara>
-                </a14:m>
-              </a:p>
-              <a:p>
-                <a:pPr lvl="0" marL="0" indent="0">
-                  <a:buNone/>
-                </a:pPr>
-                <a:r>
-                  <a:rPr/>
-                  <a:t>Some references for Bayesian statistics / data analysis are:</a:t>
-                </a:r>
-              </a:p>
-              <a:p>
-                <a:pPr lvl="1">
-                  <a:buAutoNum type="arabicPeriod"/>
-                </a:pPr>
-                <a:r>
-                  <a:rPr/>
-                  <a:t>Hoff, P.D. (2009). “</a:t>
-                </a:r>
-                <a:r>
-                  <a:rPr i="1"/>
-                  <a:t>A First Course in Bayesian Statistical Methods</a:t>
-                </a:r>
-                <a:r>
-                  <a:rPr/>
-                  <a:t>.” Springer.</a:t>
-                </a:r>
-              </a:p>
-              <a:p>
-                <a:pPr lvl="1">
-                  <a:buAutoNum type="arabicPeriod"/>
-                </a:pPr>
-                <a:r>
-                  <a:rPr/>
-                  <a:t>Gelman, A., Carlin, J.B., Stern, H.S., Dunson, D.B., Vehtari, A., Rubin, D.B. (2014). “</a:t>
-                </a:r>
-                <a:r>
-                  <a:rPr i="1"/>
-                  <a:t>Bayesian Data Analysis</a:t>
-                </a:r>
-                <a:r>
-                  <a:rPr/>
-                  <a:t>”. 3</a:t>
-                </a:r>
-                <a:r>
-                  <a:rPr baseline="30000"/>
-                  <a:t>rd</a:t>
-                </a:r>
-                <a:r>
-                  <a:rPr/>
-                  <a:t> ed. CRC Press.</a:t>
-                </a:r>
-              </a:p>
-              <a:p>
-                <a:pPr lvl="1">
-                  <a:buAutoNum type="arabicPeriod"/>
-                </a:pPr>
-                <a:r>
-                  <a:rPr/>
-                  <a:t>Ramoni, M., Sebastiani, P. (2007), ‘Bayesian Methods’, in Berthold, M., Hand, D.J. (eds.). “</a:t>
-                </a:r>
-                <a:r>
-                  <a:rPr i="1"/>
-                  <a:t>Intelligent Data Analysis</a:t>
-                </a:r>
-                <a:r>
-                  <a:rPr/>
-                  <a:t>”, 2</a:t>
-                </a:r>
-                <a:r>
-                  <a:rPr baseline="30000"/>
-                  <a:t>nd</a:t>
-                </a:r>
-                <a:r>
-                  <a:rPr/>
-                  <a:t> ed., Springer, pp.131-168</a:t>
-                </a:r>
-              </a:p>
-              <a:p>
-                <a:pPr lvl="1">
-                  <a:buAutoNum type="arabicPeriod"/>
-                </a:pPr>
-                <a:r>
-                  <a:rPr/>
-                  <a:t>Stone, J.V. (2013). “</a:t>
-                </a:r>
-                <a:r>
-                  <a:rPr i="1"/>
-                  <a:t>Bayes’ Rule: A Tutorial Introduction to Bayesian Analysis</a:t>
-                </a:r>
-                <a:r>
-                  <a:rPr/>
-                  <a:t>”. Sebtel Press.</a:t>
-                </a:r>
-              </a:p>
-            </p:txBody>
-          </p:sp>
-        </mc:Choice>
-      </mc:AlternateContent>
-    </p:spTree>
-  </p:cSld>
-</p:sld>
-</file>
-
-<file path=ppt/slides/slide30.xml><?xml version="1.0" encoding="utf-8"?>
+<file path=ppt/slides/slide31.xml><?xml version="1.0" encoding="utf-8"?>
 <p:sld xmlns:a="http://schemas.openxmlformats.org/drawingml/2006/main" xmlns:r="http://schemas.openxmlformats.org/officeDocument/2006/relationships" xmlns:p="http://schemas.openxmlformats.org/presentationml/2006/main">
   <p:cSld>
     <p:spTree>

</xml_diff>